<commit_message>
Corectarea lucrului individual la MASI nr 5 :(
</commit_message>
<xml_diff>
--- a/Sem_II/TPP/LI/SI-211_Chirita_Stanislav_TPP_LI_Securizarea_aplicaţiilor_web.pptx
+++ b/Sem_II/TPP/LI/SI-211_Chirita_Stanislav_TPP_LI_Securizarea_aplicaţiilor_web.pptx
@@ -10920,7 +10920,7 @@
         </p:spPr>
         <p:txBody>
           <a:bodyPr>
-            <a:normAutofit/>
+            <a:normAutofit lnSpcReduction="10000"/>
           </a:bodyPr>
           <a:lstStyle/>
           <a:p>
@@ -10928,11 +10928,11 @@
               <a:buNone/>
             </a:pPr>
             <a:r>
-              <a:rPr lang="en-US" sz="1600" dirty="0" err="1"/>
+              <a:rPr lang="en-US" sz="1800" dirty="0" err="1"/>
               <a:t>Scopul</a:t>
             </a:r>
             <a:r>
-              <a:rPr lang="en-US" sz="1600" dirty="0"/>
+              <a:rPr lang="en-US" sz="1800" dirty="0"/>
               <a:t>:</a:t>
             </a:r>
           </a:p>
@@ -10941,158 +10941,158 @@
               <a:buNone/>
             </a:pPr>
             <a:r>
-              <a:rPr lang="en-US" sz="1600" dirty="0" err="1"/>
+              <a:rPr lang="en-US" sz="1800" dirty="0" err="1"/>
               <a:t>Asigurarea</a:t>
             </a:r>
             <a:r>
-              <a:rPr lang="en-US" sz="1600" dirty="0"/>
-              <a:t> </a:t>
-            </a:r>
-            <a:r>
-              <a:rPr lang="en-US" sz="1600" dirty="0" err="1"/>
+              <a:rPr lang="en-US" sz="1800" dirty="0"/>
+              <a:t> </a:t>
+            </a:r>
+            <a:r>
+              <a:rPr lang="en-US" sz="1800" dirty="0" err="1"/>
               <a:t>că</a:t>
             </a:r>
             <a:r>
-              <a:rPr lang="en-US" sz="1600" dirty="0"/>
-              <a:t> </a:t>
-            </a:r>
-            <a:r>
-              <a:rPr lang="en-US" sz="1600" dirty="0" err="1"/>
+              <a:rPr lang="en-US" sz="1800" dirty="0"/>
+              <a:t> </a:t>
+            </a:r>
+            <a:r>
+              <a:rPr lang="en-US" sz="1800" dirty="0" err="1"/>
               <a:t>aplicațiile</a:t>
             </a:r>
             <a:r>
-              <a:rPr lang="en-US" sz="1600" dirty="0"/>
+              <a:rPr lang="en-US" sz="1800" dirty="0"/>
               <a:t> web sunt </a:t>
             </a:r>
             <a:r>
-              <a:rPr lang="en-US" sz="1600" dirty="0" err="1"/>
+              <a:rPr lang="en-US" sz="1800" dirty="0" err="1"/>
               <a:t>protejate</a:t>
             </a:r>
             <a:r>
-              <a:rPr lang="en-US" sz="1600" dirty="0"/>
-              <a:t> </a:t>
-            </a:r>
-            <a:r>
-              <a:rPr lang="en-US" sz="1600" dirty="0" err="1"/>
+              <a:rPr lang="en-US" sz="1800" dirty="0"/>
+              <a:t> </a:t>
+            </a:r>
+            <a:r>
+              <a:rPr lang="en-US" sz="1800" dirty="0" err="1"/>
               <a:t>împotriva</a:t>
             </a:r>
             <a:r>
-              <a:rPr lang="en-US" sz="1600" dirty="0"/>
-              <a:t> </a:t>
-            </a:r>
-            <a:r>
-              <a:rPr lang="en-US" sz="1600" dirty="0" err="1"/>
+              <a:rPr lang="en-US" sz="1800" dirty="0"/>
+              <a:t> </a:t>
+            </a:r>
+            <a:r>
+              <a:rPr lang="en-US" sz="1800" dirty="0" err="1"/>
               <a:t>amenințărilor</a:t>
             </a:r>
             <a:r>
-              <a:rPr lang="en-US" sz="1600" dirty="0"/>
+              <a:rPr lang="en-US" sz="1800" dirty="0"/>
               <a:t> de </a:t>
             </a:r>
             <a:r>
-              <a:rPr lang="en-US" sz="1600" dirty="0" err="1"/>
+              <a:rPr lang="en-US" sz="1800" dirty="0" err="1"/>
               <a:t>securitate</a:t>
             </a:r>
             <a:r>
-              <a:rPr lang="en-US" sz="1600" dirty="0"/>
-              <a:t> </a:t>
-            </a:r>
-            <a:r>
-              <a:rPr lang="en-US" sz="1600" dirty="0" err="1"/>
+              <a:rPr lang="en-US" sz="1800" dirty="0"/>
+              <a:t> </a:t>
+            </a:r>
+            <a:r>
+              <a:rPr lang="en-US" sz="1800" dirty="0" err="1"/>
               <a:t>cunoscute</a:t>
             </a:r>
             <a:r>
-              <a:rPr lang="en-US" sz="1600" dirty="0"/>
-              <a:t> </a:t>
-            </a:r>
-            <a:r>
-              <a:rPr lang="en-US" sz="1600" dirty="0" err="1"/>
+              <a:rPr lang="en-US" sz="1800" dirty="0"/>
+              <a:t> </a:t>
+            </a:r>
+            <a:r>
+              <a:rPr lang="en-US" sz="1800" dirty="0" err="1"/>
               <a:t>și</a:t>
             </a:r>
             <a:r>
-              <a:rPr lang="en-US" sz="1600" dirty="0"/>
-              <a:t> </a:t>
-            </a:r>
-            <a:r>
-              <a:rPr lang="en-US" sz="1600" dirty="0" err="1"/>
+              <a:rPr lang="en-US" sz="1800" dirty="0"/>
+              <a:t> </a:t>
+            </a:r>
+            <a:r>
+              <a:rPr lang="en-US" sz="1800" dirty="0" err="1"/>
               <a:t>că</a:t>
             </a:r>
             <a:r>
-              <a:rPr lang="en-US" sz="1600" dirty="0"/>
-              <a:t> </a:t>
-            </a:r>
-            <a:r>
-              <a:rPr lang="en-US" sz="1600" dirty="0" err="1"/>
+              <a:rPr lang="en-US" sz="1800" dirty="0"/>
+              <a:t> </a:t>
+            </a:r>
+            <a:r>
+              <a:rPr lang="en-US" sz="1800" dirty="0" err="1"/>
               <a:t>datele</a:t>
             </a:r>
             <a:r>
-              <a:rPr lang="en-US" sz="1600" dirty="0"/>
-              <a:t> </a:t>
-            </a:r>
-            <a:r>
-              <a:rPr lang="en-US" sz="1600" dirty="0" err="1"/>
+              <a:rPr lang="en-US" sz="1800" dirty="0"/>
+              <a:t> </a:t>
+            </a:r>
+            <a:r>
+              <a:rPr lang="en-US" sz="1800" dirty="0" err="1"/>
               <a:t>sensibile</a:t>
             </a:r>
             <a:r>
-              <a:rPr lang="en-US" sz="1600" dirty="0"/>
+              <a:rPr lang="en-US" sz="1800" dirty="0"/>
               <a:t> ale </a:t>
             </a:r>
             <a:r>
-              <a:rPr lang="en-US" sz="1600" dirty="0" err="1"/>
+              <a:rPr lang="en-US" sz="1800" dirty="0" err="1"/>
               <a:t>utilizatorilor</a:t>
             </a:r>
             <a:r>
-              <a:rPr lang="en-US" sz="1600" dirty="0"/>
+              <a:rPr lang="en-US" sz="1800" dirty="0"/>
               <a:t> sunt </a:t>
             </a:r>
             <a:r>
-              <a:rPr lang="en-US" sz="1600" dirty="0" err="1"/>
+              <a:rPr lang="en-US" sz="1800" dirty="0" err="1"/>
               <a:t>protejate</a:t>
             </a:r>
             <a:r>
-              <a:rPr lang="en-US" sz="1600" dirty="0"/>
-              <a:t> </a:t>
-            </a:r>
-            <a:r>
-              <a:rPr lang="en-US" sz="1600" dirty="0" err="1"/>
+              <a:rPr lang="en-US" sz="1800" dirty="0"/>
+              <a:t> </a:t>
+            </a:r>
+            <a:r>
+              <a:rPr lang="en-US" sz="1800" dirty="0" err="1"/>
               <a:t>împotriva</a:t>
             </a:r>
             <a:r>
-              <a:rPr lang="en-US" sz="1600" dirty="0"/>
-              <a:t> </a:t>
-            </a:r>
-            <a:r>
-              <a:rPr lang="en-US" sz="1600" dirty="0" err="1"/>
+              <a:rPr lang="en-US" sz="1800" dirty="0"/>
+              <a:t> </a:t>
+            </a:r>
+            <a:r>
+              <a:rPr lang="en-US" sz="1800" dirty="0" err="1"/>
               <a:t>accesului</a:t>
             </a:r>
             <a:r>
-              <a:rPr lang="en-US" sz="1600" dirty="0"/>
-              <a:t> </a:t>
-            </a:r>
-            <a:r>
-              <a:rPr lang="en-US" sz="1600" dirty="0" err="1"/>
+              <a:rPr lang="en-US" sz="1800" dirty="0"/>
+              <a:t> </a:t>
+            </a:r>
+            <a:r>
+              <a:rPr lang="en-US" sz="1800" dirty="0" err="1"/>
               <a:t>neautorizat</a:t>
             </a:r>
             <a:r>
-              <a:rPr lang="en-US" sz="1600" dirty="0"/>
-              <a:t> </a:t>
-            </a:r>
-            <a:r>
-              <a:rPr lang="en-US" sz="1600" dirty="0" err="1"/>
+              <a:rPr lang="en-US" sz="1800" dirty="0"/>
+              <a:t> </a:t>
+            </a:r>
+            <a:r>
+              <a:rPr lang="en-US" sz="1800" dirty="0" err="1"/>
               <a:t>sau</a:t>
             </a:r>
             <a:r>
-              <a:rPr lang="en-US" sz="1600" dirty="0"/>
+              <a:rPr lang="en-US" sz="1800" dirty="0"/>
               <a:t> al </a:t>
             </a:r>
             <a:r>
-              <a:rPr lang="en-US" sz="1600" dirty="0" err="1"/>
+              <a:rPr lang="en-US" sz="1800" dirty="0" err="1"/>
               <a:t>modificărilor</a:t>
             </a:r>
             <a:r>
-              <a:rPr lang="en-US" sz="1600" dirty="0"/>
+              <a:rPr lang="en-US" sz="1800" dirty="0"/>
               <a:t>.</a:t>
             </a:r>
-            <a:endParaRPr lang="ru-RU" sz="1800" b="1" dirty="0"/>
+            <a:endParaRPr lang="ru-RU" b="1" dirty="0"/>
           </a:p>
         </p:txBody>
       </p:sp>
@@ -11110,8 +11110,8 @@
         </p:nvSpPr>
         <p:spPr>
           <a:xfrm>
-            <a:off x="628649" y="3752632"/>
-            <a:ext cx="7802969" cy="3139321"/>
+            <a:off x="670515" y="3524699"/>
+            <a:ext cx="7802969" cy="3416320"/>
           </a:xfrm>
           <a:prstGeom prst="rect">
             <a:avLst/>
@@ -11126,11 +11126,15 @@
           <a:p>
             <a:pPr algn="ctr"/>
             <a:r>
-              <a:rPr lang="en-US" dirty="0" err="1"/>
+              <a:rPr lang="en-US" dirty="0" err="1">
+                <a:latin typeface="PT Sans" panose="020B0503020203020204" pitchFamily="34" charset="-52"/>
+              </a:rPr>
               <a:t>Obiective</a:t>
             </a:r>
             <a:r>
-              <a:rPr lang="en-US" dirty="0"/>
+              <a:rPr lang="en-US" dirty="0">
+                <a:latin typeface="PT Sans" panose="020B0503020203020204" pitchFamily="34" charset="-52"/>
+              </a:rPr>
               <a:t>:</a:t>
             </a:r>
           </a:p>
@@ -11140,171 +11144,255 @@
               <a:buChar char="•"/>
             </a:pPr>
             <a:r>
-              <a:rPr lang="en-US" dirty="0" err="1"/>
+              <a:rPr lang="en-US" dirty="0" err="1">
+                <a:latin typeface="PT Sans" panose="020B0503020203020204" pitchFamily="34" charset="-52"/>
+              </a:rPr>
               <a:t>Identificarea</a:t>
             </a:r>
             <a:r>
-              <a:rPr lang="en-US" dirty="0"/>
-              <a:t> </a:t>
-            </a:r>
-            <a:r>
-              <a:rPr lang="en-US" dirty="0" err="1"/>
+              <a:rPr lang="en-US" dirty="0">
+                <a:latin typeface="PT Sans" panose="020B0503020203020204" pitchFamily="34" charset="-52"/>
+              </a:rPr>
+              <a:t> </a:t>
+            </a:r>
+            <a:r>
+              <a:rPr lang="en-US" dirty="0" err="1">
+                <a:latin typeface="PT Sans" panose="020B0503020203020204" pitchFamily="34" charset="-52"/>
+              </a:rPr>
               <a:t>și</a:t>
             </a:r>
             <a:r>
-              <a:rPr lang="en-US" dirty="0"/>
-              <a:t> </a:t>
-            </a:r>
-            <a:r>
-              <a:rPr lang="en-US" dirty="0" err="1"/>
+              <a:rPr lang="en-US" dirty="0">
+                <a:latin typeface="PT Sans" panose="020B0503020203020204" pitchFamily="34" charset="-52"/>
+              </a:rPr>
+              <a:t> </a:t>
+            </a:r>
+            <a:r>
+              <a:rPr lang="en-US" dirty="0" err="1">
+                <a:latin typeface="PT Sans" panose="020B0503020203020204" pitchFamily="34" charset="-52"/>
+              </a:rPr>
               <a:t>evaluarea</a:t>
             </a:r>
             <a:r>
-              <a:rPr lang="en-US" dirty="0"/>
-              <a:t> </a:t>
-            </a:r>
-            <a:r>
-              <a:rPr lang="en-US" dirty="0" err="1"/>
+              <a:rPr lang="en-US" dirty="0">
+                <a:latin typeface="PT Sans" panose="020B0503020203020204" pitchFamily="34" charset="-52"/>
+              </a:rPr>
+              <a:t> </a:t>
+            </a:r>
+            <a:r>
+              <a:rPr lang="en-US" dirty="0" err="1">
+                <a:latin typeface="PT Sans" panose="020B0503020203020204" pitchFamily="34" charset="-52"/>
+              </a:rPr>
               <a:t>vulnerabilităților</a:t>
             </a:r>
             <a:r>
-              <a:rPr lang="en-US" dirty="0"/>
+              <a:rPr lang="en-US" dirty="0">
+                <a:latin typeface="PT Sans" panose="020B0503020203020204" pitchFamily="34" charset="-52"/>
+              </a:rPr>
               <a:t> de </a:t>
             </a:r>
             <a:r>
-              <a:rPr lang="en-US" dirty="0" err="1"/>
+              <a:rPr lang="en-US" dirty="0" err="1">
+                <a:latin typeface="PT Sans" panose="020B0503020203020204" pitchFamily="34" charset="-52"/>
+              </a:rPr>
               <a:t>securitate</a:t>
             </a:r>
             <a:r>
-              <a:rPr lang="en-US" dirty="0"/>
+              <a:rPr lang="en-US" dirty="0">
+                <a:latin typeface="PT Sans" panose="020B0503020203020204" pitchFamily="34" charset="-52"/>
+              </a:rPr>
               <a:t>: </a:t>
             </a:r>
             <a:r>
-              <a:rPr lang="en-US" dirty="0" err="1"/>
+              <a:rPr lang="en-US" dirty="0" err="1">
+                <a:latin typeface="PT Sans" panose="020B0503020203020204" pitchFamily="34" charset="-52"/>
+              </a:rPr>
               <a:t>Realizarea</a:t>
             </a:r>
             <a:r>
-              <a:rPr lang="en-US" dirty="0"/>
-              <a:t> </a:t>
-            </a:r>
-            <a:r>
-              <a:rPr lang="en-US" dirty="0" err="1"/>
+              <a:rPr lang="en-US" dirty="0">
+                <a:latin typeface="PT Sans" panose="020B0503020203020204" pitchFamily="34" charset="-52"/>
+              </a:rPr>
+              <a:t> </a:t>
+            </a:r>
+            <a:r>
+              <a:rPr lang="en-US" dirty="0" err="1">
+                <a:latin typeface="PT Sans" panose="020B0503020203020204" pitchFamily="34" charset="-52"/>
+              </a:rPr>
               <a:t>unui</a:t>
             </a:r>
             <a:r>
-              <a:rPr lang="en-US" dirty="0"/>
+              <a:rPr lang="en-US" dirty="0">
+                <a:latin typeface="PT Sans" panose="020B0503020203020204" pitchFamily="34" charset="-52"/>
+              </a:rPr>
               <a:t> audit </a:t>
             </a:r>
             <a:r>
-              <a:rPr lang="en-US" dirty="0" err="1"/>
+              <a:rPr lang="en-US" dirty="0" err="1">
+                <a:latin typeface="PT Sans" panose="020B0503020203020204" pitchFamily="34" charset="-52"/>
+              </a:rPr>
               <a:t>complet</a:t>
             </a:r>
             <a:r>
-              <a:rPr lang="en-US" dirty="0"/>
+              <a:rPr lang="en-US" dirty="0">
+                <a:latin typeface="PT Sans" panose="020B0503020203020204" pitchFamily="34" charset="-52"/>
+              </a:rPr>
               <a:t> al </a:t>
             </a:r>
             <a:r>
-              <a:rPr lang="en-US" dirty="0" err="1"/>
+              <a:rPr lang="en-US" dirty="0" err="1">
+                <a:latin typeface="PT Sans" panose="020B0503020203020204" pitchFamily="34" charset="-52"/>
+              </a:rPr>
               <a:t>aplicației</a:t>
             </a:r>
             <a:r>
-              <a:rPr lang="en-US" dirty="0"/>
+              <a:rPr lang="en-US" dirty="0">
+                <a:latin typeface="PT Sans" panose="020B0503020203020204" pitchFamily="34" charset="-52"/>
+              </a:rPr>
               <a:t> web </a:t>
             </a:r>
             <a:r>
-              <a:rPr lang="en-US" dirty="0" err="1"/>
+              <a:rPr lang="en-US" dirty="0" err="1">
+                <a:latin typeface="PT Sans" panose="020B0503020203020204" pitchFamily="34" charset="-52"/>
+              </a:rPr>
               <a:t>pentru</a:t>
             </a:r>
             <a:r>
-              <a:rPr lang="en-US" dirty="0"/>
-              <a:t> </a:t>
-            </a:r>
-            <a:r>
-              <a:rPr lang="en-US" dirty="0" err="1"/>
+              <a:rPr lang="en-US" dirty="0">
+                <a:latin typeface="PT Sans" panose="020B0503020203020204" pitchFamily="34" charset="-52"/>
+              </a:rPr>
+              <a:t> </a:t>
+            </a:r>
+            <a:r>
+              <a:rPr lang="en-US" dirty="0" err="1">
+                <a:latin typeface="PT Sans" panose="020B0503020203020204" pitchFamily="34" charset="-52"/>
+              </a:rPr>
               <a:t>identificarea</a:t>
             </a:r>
             <a:r>
-              <a:rPr lang="en-US" dirty="0"/>
-              <a:t> </a:t>
-            </a:r>
-            <a:r>
-              <a:rPr lang="en-US" dirty="0" err="1"/>
+              <a:rPr lang="en-US" dirty="0">
+                <a:latin typeface="PT Sans" panose="020B0503020203020204" pitchFamily="34" charset="-52"/>
+              </a:rPr>
+              <a:t> </a:t>
+            </a:r>
+            <a:r>
+              <a:rPr lang="en-US" dirty="0" err="1">
+                <a:latin typeface="PT Sans" panose="020B0503020203020204" pitchFamily="34" charset="-52"/>
+              </a:rPr>
               <a:t>și</a:t>
             </a:r>
             <a:r>
-              <a:rPr lang="en-US" dirty="0"/>
-              <a:t> </a:t>
-            </a:r>
-            <a:r>
-              <a:rPr lang="en-US" dirty="0" err="1"/>
+              <a:rPr lang="en-US" dirty="0">
+                <a:latin typeface="PT Sans" panose="020B0503020203020204" pitchFamily="34" charset="-52"/>
+              </a:rPr>
+              <a:t> </a:t>
+            </a:r>
+            <a:r>
+              <a:rPr lang="en-US" dirty="0" err="1">
+                <a:latin typeface="PT Sans" panose="020B0503020203020204" pitchFamily="34" charset="-52"/>
+              </a:rPr>
               <a:t>evaluarea</a:t>
             </a:r>
             <a:r>
-              <a:rPr lang="en-US" dirty="0"/>
-              <a:t> </a:t>
-            </a:r>
-            <a:r>
-              <a:rPr lang="en-US" dirty="0" err="1"/>
+              <a:rPr lang="en-US" dirty="0">
+                <a:latin typeface="PT Sans" panose="020B0503020203020204" pitchFamily="34" charset="-52"/>
+              </a:rPr>
+              <a:t> </a:t>
+            </a:r>
+            <a:r>
+              <a:rPr lang="en-US" dirty="0" err="1">
+                <a:latin typeface="PT Sans" panose="020B0503020203020204" pitchFamily="34" charset="-52"/>
+              </a:rPr>
               <a:t>potențialelor</a:t>
             </a:r>
             <a:r>
-              <a:rPr lang="en-US" dirty="0"/>
-              <a:t> </a:t>
-            </a:r>
-            <a:r>
-              <a:rPr lang="en-US" dirty="0" err="1"/>
+              <a:rPr lang="en-US" dirty="0">
+                <a:latin typeface="PT Sans" panose="020B0503020203020204" pitchFamily="34" charset="-52"/>
+              </a:rPr>
+              <a:t> </a:t>
+            </a:r>
+            <a:r>
+              <a:rPr lang="en-US" dirty="0" err="1">
+                <a:latin typeface="PT Sans" panose="020B0503020203020204" pitchFamily="34" charset="-52"/>
+              </a:rPr>
               <a:t>puncte</a:t>
             </a:r>
             <a:r>
-              <a:rPr lang="en-US" dirty="0"/>
-              <a:t> </a:t>
-            </a:r>
-            <a:r>
-              <a:rPr lang="en-US" dirty="0" err="1"/>
+              <a:rPr lang="en-US" dirty="0">
+                <a:latin typeface="PT Sans" panose="020B0503020203020204" pitchFamily="34" charset="-52"/>
+              </a:rPr>
+              <a:t> </a:t>
+            </a:r>
+            <a:r>
+              <a:rPr lang="en-US" dirty="0" err="1">
+                <a:latin typeface="PT Sans" panose="020B0503020203020204" pitchFamily="34" charset="-52"/>
+              </a:rPr>
               <a:t>slabe</a:t>
             </a:r>
             <a:r>
-              <a:rPr lang="en-US" dirty="0"/>
-              <a:t> </a:t>
-            </a:r>
-            <a:r>
-              <a:rPr lang="en-US" dirty="0" err="1"/>
+              <a:rPr lang="en-US" dirty="0">
+                <a:latin typeface="PT Sans" panose="020B0503020203020204" pitchFamily="34" charset="-52"/>
+              </a:rPr>
+              <a:t> </a:t>
+            </a:r>
+            <a:r>
+              <a:rPr lang="en-US" dirty="0" err="1">
+                <a:latin typeface="PT Sans" panose="020B0503020203020204" pitchFamily="34" charset="-52"/>
+              </a:rPr>
               <a:t>și</a:t>
             </a:r>
             <a:r>
-              <a:rPr lang="en-US" dirty="0"/>
-              <a:t> </a:t>
-            </a:r>
-            <a:r>
-              <a:rPr lang="en-US" dirty="0" err="1"/>
+              <a:rPr lang="en-US" dirty="0">
+                <a:latin typeface="PT Sans" panose="020B0503020203020204" pitchFamily="34" charset="-52"/>
+              </a:rPr>
+              <a:t> </a:t>
+            </a:r>
+            <a:r>
+              <a:rPr lang="en-US" dirty="0" err="1">
+                <a:latin typeface="PT Sans" panose="020B0503020203020204" pitchFamily="34" charset="-52"/>
+              </a:rPr>
               <a:t>vulnerabilități</a:t>
             </a:r>
             <a:r>
-              <a:rPr lang="en-US" dirty="0"/>
+              <a:rPr lang="en-US" dirty="0">
+                <a:latin typeface="PT Sans" panose="020B0503020203020204" pitchFamily="34" charset="-52"/>
+              </a:rPr>
               <a:t> de </a:t>
             </a:r>
             <a:r>
-              <a:rPr lang="en-US" dirty="0" err="1"/>
+              <a:rPr lang="en-US" dirty="0" err="1">
+                <a:latin typeface="PT Sans" panose="020B0503020203020204" pitchFamily="34" charset="-52"/>
+              </a:rPr>
               <a:t>securitate</a:t>
             </a:r>
             <a:r>
-              <a:rPr lang="en-US" dirty="0"/>
+              <a:rPr lang="en-US" dirty="0">
+                <a:latin typeface="PT Sans" panose="020B0503020203020204" pitchFamily="34" charset="-52"/>
+              </a:rPr>
               <a:t>, cum </a:t>
             </a:r>
             <a:r>
-              <a:rPr lang="en-US" dirty="0" err="1"/>
+              <a:rPr lang="en-US" dirty="0" err="1">
+                <a:latin typeface="PT Sans" panose="020B0503020203020204" pitchFamily="34" charset="-52"/>
+              </a:rPr>
               <a:t>ar</a:t>
             </a:r>
             <a:r>
-              <a:rPr lang="en-US" dirty="0"/>
+              <a:rPr lang="en-US" dirty="0">
+                <a:latin typeface="PT Sans" panose="020B0503020203020204" pitchFamily="34" charset="-52"/>
+              </a:rPr>
               <a:t> fi </a:t>
             </a:r>
             <a:r>
-              <a:rPr lang="en-US" dirty="0" err="1"/>
+              <a:rPr lang="en-US" dirty="0" err="1">
+                <a:latin typeface="PT Sans" panose="020B0503020203020204" pitchFamily="34" charset="-52"/>
+              </a:rPr>
               <a:t>injecțiile</a:t>
             </a:r>
             <a:r>
-              <a:rPr lang="en-US" dirty="0"/>
+              <a:rPr lang="en-US" dirty="0">
+                <a:latin typeface="PT Sans" panose="020B0503020203020204" pitchFamily="34" charset="-52"/>
+              </a:rPr>
               <a:t> SQL, cross-site scripting (XSS), cross-site request forgery (CSRF) etc.</a:t>
             </a:r>
           </a:p>
@@ -11314,179 +11402,267 @@
               <a:buChar char="•"/>
             </a:pPr>
             <a:r>
-              <a:rPr lang="en-US" dirty="0" err="1"/>
+              <a:rPr lang="en-US" dirty="0" err="1">
+                <a:latin typeface="PT Sans" panose="020B0503020203020204" pitchFamily="34" charset="-52"/>
+              </a:rPr>
               <a:t>Testarea</a:t>
             </a:r>
             <a:r>
-              <a:rPr lang="en-US" dirty="0"/>
-              <a:t> </a:t>
-            </a:r>
-            <a:r>
-              <a:rPr lang="en-US" dirty="0" err="1"/>
+              <a:rPr lang="en-US" dirty="0">
+                <a:latin typeface="PT Sans" panose="020B0503020203020204" pitchFamily="34" charset="-52"/>
+              </a:rPr>
+              <a:t> </a:t>
+            </a:r>
+            <a:r>
+              <a:rPr lang="en-US" dirty="0" err="1">
+                <a:latin typeface="PT Sans" panose="020B0503020203020204" pitchFamily="34" charset="-52"/>
+              </a:rPr>
               <a:t>autentificării</a:t>
             </a:r>
             <a:r>
-              <a:rPr lang="en-US" dirty="0"/>
-              <a:t> </a:t>
-            </a:r>
-            <a:r>
-              <a:rPr lang="en-US" dirty="0" err="1"/>
+              <a:rPr lang="en-US" dirty="0">
+                <a:latin typeface="PT Sans" panose="020B0503020203020204" pitchFamily="34" charset="-52"/>
+              </a:rPr>
+              <a:t> </a:t>
+            </a:r>
+            <a:r>
+              <a:rPr lang="en-US" dirty="0" err="1">
+                <a:latin typeface="PT Sans" panose="020B0503020203020204" pitchFamily="34" charset="-52"/>
+              </a:rPr>
               <a:t>și</a:t>
             </a:r>
             <a:r>
-              <a:rPr lang="en-US" dirty="0"/>
-              <a:t> </a:t>
-            </a:r>
-            <a:r>
-              <a:rPr lang="en-US" dirty="0" err="1"/>
+              <a:rPr lang="en-US" dirty="0">
+                <a:latin typeface="PT Sans" panose="020B0503020203020204" pitchFamily="34" charset="-52"/>
+              </a:rPr>
+              <a:t> </a:t>
+            </a:r>
+            <a:r>
+              <a:rPr lang="en-US" dirty="0" err="1">
+                <a:latin typeface="PT Sans" panose="020B0503020203020204" pitchFamily="34" charset="-52"/>
+              </a:rPr>
               <a:t>autorizării</a:t>
             </a:r>
             <a:r>
-              <a:rPr lang="en-US" dirty="0"/>
+              <a:rPr lang="en-US" dirty="0">
+                <a:latin typeface="PT Sans" panose="020B0503020203020204" pitchFamily="34" charset="-52"/>
+              </a:rPr>
               <a:t>: </a:t>
             </a:r>
             <a:r>
-              <a:rPr lang="en-US" dirty="0" err="1"/>
+              <a:rPr lang="en-US" dirty="0" err="1">
+                <a:latin typeface="PT Sans" panose="020B0503020203020204" pitchFamily="34" charset="-52"/>
+              </a:rPr>
               <a:t>Verificarea</a:t>
             </a:r>
             <a:r>
-              <a:rPr lang="en-US" dirty="0"/>
-              <a:t> </a:t>
-            </a:r>
-            <a:r>
-              <a:rPr lang="en-US" dirty="0" err="1"/>
+              <a:rPr lang="en-US" dirty="0">
+                <a:latin typeface="PT Sans" panose="020B0503020203020204" pitchFamily="34" charset="-52"/>
+              </a:rPr>
+              <a:t> </a:t>
+            </a:r>
+            <a:r>
+              <a:rPr lang="en-US" dirty="0" err="1">
+                <a:latin typeface="PT Sans" panose="020B0503020203020204" pitchFamily="34" charset="-52"/>
+              </a:rPr>
               <a:t>robusteței</a:t>
             </a:r>
             <a:r>
-              <a:rPr lang="en-US" dirty="0"/>
-              <a:t> </a:t>
-            </a:r>
-            <a:r>
-              <a:rPr lang="en-US" dirty="0" err="1"/>
+              <a:rPr lang="en-US" dirty="0">
+                <a:latin typeface="PT Sans" panose="020B0503020203020204" pitchFamily="34" charset="-52"/>
+              </a:rPr>
+              <a:t> </a:t>
+            </a:r>
+            <a:r>
+              <a:rPr lang="en-US" dirty="0" err="1">
+                <a:latin typeface="PT Sans" panose="020B0503020203020204" pitchFamily="34" charset="-52"/>
+              </a:rPr>
               <a:t>mecanismelor</a:t>
             </a:r>
             <a:r>
-              <a:rPr lang="en-US" dirty="0"/>
+              <a:rPr lang="en-US" dirty="0">
+                <a:latin typeface="PT Sans" panose="020B0503020203020204" pitchFamily="34" charset="-52"/>
+              </a:rPr>
               <a:t> de </a:t>
             </a:r>
             <a:r>
-              <a:rPr lang="en-US" dirty="0" err="1"/>
+              <a:rPr lang="en-US" dirty="0" err="1">
+                <a:latin typeface="PT Sans" panose="020B0503020203020204" pitchFamily="34" charset="-52"/>
+              </a:rPr>
               <a:t>autentificare</a:t>
             </a:r>
             <a:r>
-              <a:rPr lang="en-US" dirty="0"/>
-              <a:t> </a:t>
-            </a:r>
-            <a:r>
-              <a:rPr lang="en-US" dirty="0" err="1"/>
+              <a:rPr lang="en-US" dirty="0">
+                <a:latin typeface="PT Sans" panose="020B0503020203020204" pitchFamily="34" charset="-52"/>
+              </a:rPr>
+              <a:t> </a:t>
+            </a:r>
+            <a:r>
+              <a:rPr lang="en-US" dirty="0" err="1">
+                <a:latin typeface="PT Sans" panose="020B0503020203020204" pitchFamily="34" charset="-52"/>
+              </a:rPr>
               <a:t>și</a:t>
             </a:r>
             <a:r>
-              <a:rPr lang="en-US" dirty="0"/>
-              <a:t> </a:t>
-            </a:r>
-            <a:r>
-              <a:rPr lang="en-US" dirty="0" err="1"/>
+              <a:rPr lang="en-US" dirty="0">
+                <a:latin typeface="PT Sans" panose="020B0503020203020204" pitchFamily="34" charset="-52"/>
+              </a:rPr>
+              <a:t> </a:t>
+            </a:r>
+            <a:r>
+              <a:rPr lang="en-US" dirty="0" err="1">
+                <a:latin typeface="PT Sans" panose="020B0503020203020204" pitchFamily="34" charset="-52"/>
+              </a:rPr>
               <a:t>autorizare</a:t>
             </a:r>
             <a:r>
-              <a:rPr lang="en-US" dirty="0"/>
+              <a:rPr lang="en-US" dirty="0">
+                <a:latin typeface="PT Sans" panose="020B0503020203020204" pitchFamily="34" charset="-52"/>
+              </a:rPr>
               <a:t> ale </a:t>
             </a:r>
             <a:r>
-              <a:rPr lang="en-US" dirty="0" err="1"/>
+              <a:rPr lang="en-US" dirty="0" err="1">
+                <a:latin typeface="PT Sans" panose="020B0503020203020204" pitchFamily="34" charset="-52"/>
+              </a:rPr>
               <a:t>aplicației</a:t>
             </a:r>
             <a:r>
-              <a:rPr lang="en-US" dirty="0"/>
+              <a:rPr lang="en-US" dirty="0">
+                <a:latin typeface="PT Sans" panose="020B0503020203020204" pitchFamily="34" charset="-52"/>
+              </a:rPr>
               <a:t> web </a:t>
             </a:r>
             <a:r>
-              <a:rPr lang="en-US" dirty="0" err="1"/>
+              <a:rPr lang="en-US" dirty="0" err="1">
+                <a:latin typeface="PT Sans" panose="020B0503020203020204" pitchFamily="34" charset="-52"/>
+              </a:rPr>
               <a:t>pentru</a:t>
             </a:r>
             <a:r>
-              <a:rPr lang="en-US" dirty="0"/>
+              <a:rPr lang="en-US" dirty="0">
+                <a:latin typeface="PT Sans" panose="020B0503020203020204" pitchFamily="34" charset="-52"/>
+              </a:rPr>
               <a:t> a </a:t>
             </a:r>
             <a:r>
-              <a:rPr lang="en-US" dirty="0" err="1"/>
+              <a:rPr lang="en-US" dirty="0" err="1">
+                <a:latin typeface="PT Sans" panose="020B0503020203020204" pitchFamily="34" charset="-52"/>
+              </a:rPr>
               <a:t>asigura</a:t>
             </a:r>
             <a:r>
-              <a:rPr lang="en-US" dirty="0"/>
-              <a:t> </a:t>
-            </a:r>
-            <a:r>
-              <a:rPr lang="en-US" dirty="0" err="1"/>
+              <a:rPr lang="en-US" dirty="0">
+                <a:latin typeface="PT Sans" panose="020B0503020203020204" pitchFamily="34" charset="-52"/>
+              </a:rPr>
+              <a:t> </a:t>
+            </a:r>
+            <a:r>
+              <a:rPr lang="en-US" dirty="0" err="1">
+                <a:latin typeface="PT Sans" panose="020B0503020203020204" pitchFamily="34" charset="-52"/>
+              </a:rPr>
               <a:t>că</a:t>
             </a:r>
             <a:r>
-              <a:rPr lang="en-US" dirty="0"/>
-              <a:t> </a:t>
-            </a:r>
-            <a:r>
-              <a:rPr lang="en-US" dirty="0" err="1"/>
+              <a:rPr lang="en-US" dirty="0">
+                <a:latin typeface="PT Sans" panose="020B0503020203020204" pitchFamily="34" charset="-52"/>
+              </a:rPr>
+              <a:t> </a:t>
+            </a:r>
+            <a:r>
+              <a:rPr lang="en-US" dirty="0" err="1">
+                <a:latin typeface="PT Sans" panose="020B0503020203020204" pitchFamily="34" charset="-52"/>
+              </a:rPr>
               <a:t>doar</a:t>
             </a:r>
             <a:r>
-              <a:rPr lang="en-US" dirty="0"/>
-              <a:t> </a:t>
-            </a:r>
-            <a:r>
-              <a:rPr lang="en-US" dirty="0" err="1"/>
+              <a:rPr lang="en-US" dirty="0">
+                <a:latin typeface="PT Sans" panose="020B0503020203020204" pitchFamily="34" charset="-52"/>
+              </a:rPr>
+              <a:t> </a:t>
+            </a:r>
+            <a:r>
+              <a:rPr lang="en-US" dirty="0" err="1">
+                <a:latin typeface="PT Sans" panose="020B0503020203020204" pitchFamily="34" charset="-52"/>
+              </a:rPr>
               <a:t>utilizatorii</a:t>
             </a:r>
             <a:r>
-              <a:rPr lang="en-US" dirty="0"/>
-              <a:t> </a:t>
-            </a:r>
-            <a:r>
-              <a:rPr lang="en-US" dirty="0" err="1"/>
+              <a:rPr lang="en-US" dirty="0">
+                <a:latin typeface="PT Sans" panose="020B0503020203020204" pitchFamily="34" charset="-52"/>
+              </a:rPr>
+              <a:t> </a:t>
+            </a:r>
+            <a:r>
+              <a:rPr lang="en-US" dirty="0" err="1">
+                <a:latin typeface="PT Sans" panose="020B0503020203020204" pitchFamily="34" charset="-52"/>
+              </a:rPr>
               <a:t>autorizați</a:t>
             </a:r>
             <a:r>
-              <a:rPr lang="en-US" dirty="0"/>
+              <a:rPr lang="en-US" dirty="0">
+                <a:latin typeface="PT Sans" panose="020B0503020203020204" pitchFamily="34" charset="-52"/>
+              </a:rPr>
               <a:t> au </a:t>
             </a:r>
             <a:r>
-              <a:rPr lang="en-US" dirty="0" err="1"/>
+              <a:rPr lang="en-US" dirty="0" err="1">
+                <a:latin typeface="PT Sans" panose="020B0503020203020204" pitchFamily="34" charset="-52"/>
+              </a:rPr>
               <a:t>acces</a:t>
             </a:r>
             <a:r>
-              <a:rPr lang="en-US" dirty="0"/>
+              <a:rPr lang="en-US" dirty="0">
+                <a:latin typeface="PT Sans" panose="020B0503020203020204" pitchFamily="34" charset="-52"/>
+              </a:rPr>
               <a:t> la </a:t>
             </a:r>
             <a:r>
-              <a:rPr lang="en-US" dirty="0" err="1"/>
+              <a:rPr lang="en-US" dirty="0" err="1">
+                <a:latin typeface="PT Sans" panose="020B0503020203020204" pitchFamily="34" charset="-52"/>
+              </a:rPr>
               <a:t>resursele</a:t>
             </a:r>
             <a:r>
-              <a:rPr lang="en-US" dirty="0"/>
-              <a:t> </a:t>
-            </a:r>
-            <a:r>
-              <a:rPr lang="en-US" dirty="0" err="1"/>
+              <a:rPr lang="en-US" dirty="0">
+                <a:latin typeface="PT Sans" panose="020B0503020203020204" pitchFamily="34" charset="-52"/>
+              </a:rPr>
+              <a:t> </a:t>
+            </a:r>
+            <a:r>
+              <a:rPr lang="en-US" dirty="0" err="1">
+                <a:latin typeface="PT Sans" panose="020B0503020203020204" pitchFamily="34" charset="-52"/>
+              </a:rPr>
               <a:t>și</a:t>
             </a:r>
             <a:r>
-              <a:rPr lang="en-US" dirty="0"/>
-              <a:t> </a:t>
-            </a:r>
-            <a:r>
-              <a:rPr lang="en-US" dirty="0" err="1"/>
+              <a:rPr lang="en-US" dirty="0">
+                <a:latin typeface="PT Sans" panose="020B0503020203020204" pitchFamily="34" charset="-52"/>
+              </a:rPr>
+              <a:t> </a:t>
+            </a:r>
+            <a:r>
+              <a:rPr lang="en-US" dirty="0" err="1">
+                <a:latin typeface="PT Sans" panose="020B0503020203020204" pitchFamily="34" charset="-52"/>
+              </a:rPr>
               <a:t>funcționalitățile</a:t>
             </a:r>
             <a:r>
-              <a:rPr lang="en-US" dirty="0"/>
-              <a:t> </a:t>
-            </a:r>
-            <a:r>
-              <a:rPr lang="en-US" dirty="0" err="1"/>
+              <a:rPr lang="en-US" dirty="0">
+                <a:latin typeface="PT Sans" panose="020B0503020203020204" pitchFamily="34" charset="-52"/>
+              </a:rPr>
+              <a:t> </a:t>
+            </a:r>
+            <a:r>
+              <a:rPr lang="en-US" dirty="0" err="1">
+                <a:latin typeface="PT Sans" panose="020B0503020203020204" pitchFamily="34" charset="-52"/>
+              </a:rPr>
               <a:t>adecvate</a:t>
             </a:r>
             <a:r>
-              <a:rPr lang="en-US" dirty="0"/>
+              <a:rPr lang="en-US" dirty="0">
+                <a:latin typeface="PT Sans" panose="020B0503020203020204" pitchFamily="34" charset="-52"/>
+              </a:rPr>
               <a:t>.</a:t>
             </a:r>
           </a:p>
@@ -11496,206 +11672,308 @@
               <a:buChar char="•"/>
             </a:pPr>
             <a:r>
-              <a:rPr lang="en-US" dirty="0" err="1"/>
+              <a:rPr lang="en-US" dirty="0" err="1">
+                <a:latin typeface="PT Sans" panose="020B0503020203020204" pitchFamily="34" charset="-52"/>
+              </a:rPr>
               <a:t>Testarea</a:t>
             </a:r>
             <a:r>
-              <a:rPr lang="en-US" dirty="0"/>
-              <a:t> </a:t>
-            </a:r>
-            <a:r>
-              <a:rPr lang="en-US" dirty="0" err="1"/>
+              <a:rPr lang="en-US" dirty="0">
+                <a:latin typeface="PT Sans" panose="020B0503020203020204" pitchFamily="34" charset="-52"/>
+              </a:rPr>
+              <a:t> </a:t>
+            </a:r>
+            <a:r>
+              <a:rPr lang="en-US" dirty="0" err="1">
+                <a:latin typeface="PT Sans" panose="020B0503020203020204" pitchFamily="34" charset="-52"/>
+              </a:rPr>
               <a:t>criptării</a:t>
             </a:r>
             <a:r>
-              <a:rPr lang="en-US" dirty="0"/>
-              <a:t> </a:t>
-            </a:r>
-            <a:r>
-              <a:rPr lang="en-US" dirty="0" err="1"/>
+              <a:rPr lang="en-US" dirty="0">
+                <a:latin typeface="PT Sans" panose="020B0503020203020204" pitchFamily="34" charset="-52"/>
+              </a:rPr>
+              <a:t> </a:t>
+            </a:r>
+            <a:r>
+              <a:rPr lang="en-US" dirty="0" err="1">
+                <a:latin typeface="PT Sans" panose="020B0503020203020204" pitchFamily="34" charset="-52"/>
+              </a:rPr>
               <a:t>și</a:t>
             </a:r>
             <a:r>
-              <a:rPr lang="en-US" dirty="0"/>
+              <a:rPr lang="en-US" dirty="0">
+                <a:latin typeface="PT Sans" panose="020B0503020203020204" pitchFamily="34" charset="-52"/>
+              </a:rPr>
               <a:t> a </a:t>
             </a:r>
             <a:r>
-              <a:rPr lang="en-US" dirty="0" err="1"/>
+              <a:rPr lang="en-US" dirty="0" err="1">
+                <a:latin typeface="PT Sans" panose="020B0503020203020204" pitchFamily="34" charset="-52"/>
+              </a:rPr>
               <a:t>managementului</a:t>
             </a:r>
             <a:r>
-              <a:rPr lang="en-US" dirty="0"/>
-              <a:t> </a:t>
-            </a:r>
-            <a:r>
-              <a:rPr lang="en-US" dirty="0" err="1"/>
+              <a:rPr lang="en-US" dirty="0">
+                <a:latin typeface="PT Sans" panose="020B0503020203020204" pitchFamily="34" charset="-52"/>
+              </a:rPr>
+              <a:t> </a:t>
+            </a:r>
+            <a:r>
+              <a:rPr lang="en-US" dirty="0" err="1">
+                <a:latin typeface="PT Sans" panose="020B0503020203020204" pitchFamily="34" charset="-52"/>
+              </a:rPr>
               <a:t>sesiunii</a:t>
             </a:r>
             <a:r>
-              <a:rPr lang="en-US" dirty="0"/>
+              <a:rPr lang="en-US" dirty="0">
+                <a:latin typeface="PT Sans" panose="020B0503020203020204" pitchFamily="34" charset="-52"/>
+              </a:rPr>
               <a:t>: </a:t>
             </a:r>
             <a:r>
-              <a:rPr lang="en-US" dirty="0" err="1"/>
+              <a:rPr lang="en-US" dirty="0" err="1">
+                <a:latin typeface="PT Sans" panose="020B0503020203020204" pitchFamily="34" charset="-52"/>
+              </a:rPr>
               <a:t>Evaluarea</a:t>
             </a:r>
             <a:r>
-              <a:rPr lang="en-US" dirty="0"/>
-              <a:t> </a:t>
-            </a:r>
-            <a:r>
-              <a:rPr lang="en-US" dirty="0" err="1"/>
+              <a:rPr lang="en-US" dirty="0">
+                <a:latin typeface="PT Sans" panose="020B0503020203020204" pitchFamily="34" charset="-52"/>
+              </a:rPr>
+              <a:t> </a:t>
+            </a:r>
+            <a:r>
+              <a:rPr lang="en-US" dirty="0" err="1">
+                <a:latin typeface="PT Sans" panose="020B0503020203020204" pitchFamily="34" charset="-52"/>
+              </a:rPr>
               <a:t>modului</a:t>
             </a:r>
             <a:r>
-              <a:rPr lang="en-US" dirty="0"/>
-              <a:t> </a:t>
-            </a:r>
-            <a:r>
-              <a:rPr lang="en-US" dirty="0" err="1"/>
+              <a:rPr lang="en-US" dirty="0">
+                <a:latin typeface="PT Sans" panose="020B0503020203020204" pitchFamily="34" charset="-52"/>
+              </a:rPr>
+              <a:t> </a:t>
+            </a:r>
+            <a:r>
+              <a:rPr lang="en-US" dirty="0" err="1">
+                <a:latin typeface="PT Sans" panose="020B0503020203020204" pitchFamily="34" charset="-52"/>
+              </a:rPr>
               <a:t>în</a:t>
             </a:r>
             <a:r>
-              <a:rPr lang="en-US" dirty="0"/>
+              <a:rPr lang="en-US" dirty="0">
+                <a:latin typeface="PT Sans" panose="020B0503020203020204" pitchFamily="34" charset="-52"/>
+              </a:rPr>
               <a:t> care </a:t>
             </a:r>
             <a:r>
-              <a:rPr lang="en-US" dirty="0" err="1"/>
+              <a:rPr lang="en-US" dirty="0" err="1">
+                <a:latin typeface="PT Sans" panose="020B0503020203020204" pitchFamily="34" charset="-52"/>
+              </a:rPr>
               <a:t>datele</a:t>
             </a:r>
             <a:r>
-              <a:rPr lang="en-US" dirty="0"/>
-              <a:t> </a:t>
-            </a:r>
-            <a:r>
-              <a:rPr lang="en-US" dirty="0" err="1"/>
+              <a:rPr lang="en-US" dirty="0">
+                <a:latin typeface="PT Sans" panose="020B0503020203020204" pitchFamily="34" charset="-52"/>
+              </a:rPr>
+              <a:t> </a:t>
+            </a:r>
+            <a:r>
+              <a:rPr lang="en-US" dirty="0" err="1">
+                <a:latin typeface="PT Sans" panose="020B0503020203020204" pitchFamily="34" charset="-52"/>
+              </a:rPr>
               <a:t>sensibile</a:t>
             </a:r>
             <a:r>
-              <a:rPr lang="en-US" dirty="0"/>
+              <a:rPr lang="en-US" dirty="0">
+                <a:latin typeface="PT Sans" panose="020B0503020203020204" pitchFamily="34" charset="-52"/>
+              </a:rPr>
               <a:t> sunt </a:t>
             </a:r>
             <a:r>
-              <a:rPr lang="en-US" dirty="0" err="1"/>
+              <a:rPr lang="en-US" dirty="0" err="1">
+                <a:latin typeface="PT Sans" panose="020B0503020203020204" pitchFamily="34" charset="-52"/>
+              </a:rPr>
               <a:t>criptate</a:t>
             </a:r>
             <a:r>
-              <a:rPr lang="en-US" dirty="0"/>
-              <a:t> </a:t>
-            </a:r>
-            <a:r>
-              <a:rPr lang="en-US" dirty="0" err="1"/>
+              <a:rPr lang="en-US" dirty="0">
+                <a:latin typeface="PT Sans" panose="020B0503020203020204" pitchFamily="34" charset="-52"/>
+              </a:rPr>
+              <a:t> </a:t>
+            </a:r>
+            <a:r>
+              <a:rPr lang="en-US" dirty="0" err="1">
+                <a:latin typeface="PT Sans" panose="020B0503020203020204" pitchFamily="34" charset="-52"/>
+              </a:rPr>
               <a:t>în</a:t>
             </a:r>
             <a:r>
-              <a:rPr lang="en-US" dirty="0"/>
-              <a:t> </a:t>
-            </a:r>
-            <a:r>
-              <a:rPr lang="en-US" dirty="0" err="1"/>
+              <a:rPr lang="en-US" dirty="0">
+                <a:latin typeface="PT Sans" panose="020B0503020203020204" pitchFamily="34" charset="-52"/>
+              </a:rPr>
+              <a:t> </a:t>
+            </a:r>
+            <a:r>
+              <a:rPr lang="en-US" dirty="0" err="1">
+                <a:latin typeface="PT Sans" panose="020B0503020203020204" pitchFamily="34" charset="-52"/>
+              </a:rPr>
               <a:t>tranzit</a:t>
             </a:r>
             <a:r>
-              <a:rPr lang="en-US" dirty="0"/>
-              <a:t> </a:t>
-            </a:r>
-            <a:r>
-              <a:rPr lang="en-US" dirty="0" err="1"/>
+              <a:rPr lang="en-US" dirty="0">
+                <a:latin typeface="PT Sans" panose="020B0503020203020204" pitchFamily="34" charset="-52"/>
+              </a:rPr>
+              <a:t> </a:t>
+            </a:r>
+            <a:r>
+              <a:rPr lang="en-US" dirty="0" err="1">
+                <a:latin typeface="PT Sans" panose="020B0503020203020204" pitchFamily="34" charset="-52"/>
+              </a:rPr>
               <a:t>și</a:t>
             </a:r>
             <a:r>
-              <a:rPr lang="en-US" dirty="0"/>
-              <a:t> </a:t>
-            </a:r>
-            <a:r>
-              <a:rPr lang="en-US" dirty="0" err="1"/>
+              <a:rPr lang="en-US" dirty="0">
+                <a:latin typeface="PT Sans" panose="020B0503020203020204" pitchFamily="34" charset="-52"/>
+              </a:rPr>
+              <a:t> </a:t>
+            </a:r>
+            <a:r>
+              <a:rPr lang="en-US" dirty="0" err="1">
+                <a:latin typeface="PT Sans" panose="020B0503020203020204" pitchFamily="34" charset="-52"/>
+              </a:rPr>
               <a:t>în</a:t>
             </a:r>
             <a:r>
-              <a:rPr lang="en-US" dirty="0"/>
-              <a:t> </a:t>
-            </a:r>
-            <a:r>
-              <a:rPr lang="en-US" dirty="0" err="1"/>
+              <a:rPr lang="en-US" dirty="0">
+                <a:latin typeface="PT Sans" panose="020B0503020203020204" pitchFamily="34" charset="-52"/>
+              </a:rPr>
+              <a:t> </a:t>
+            </a:r>
+            <a:r>
+              <a:rPr lang="en-US" dirty="0" err="1">
+                <a:latin typeface="PT Sans" panose="020B0503020203020204" pitchFamily="34" charset="-52"/>
+              </a:rPr>
               <a:t>repaus</a:t>
             </a:r>
             <a:r>
-              <a:rPr lang="en-US" dirty="0"/>
+              <a:rPr lang="en-US" dirty="0">
+                <a:latin typeface="PT Sans" panose="020B0503020203020204" pitchFamily="34" charset="-52"/>
+              </a:rPr>
               <a:t>, </a:t>
             </a:r>
             <a:r>
-              <a:rPr lang="en-US" dirty="0" err="1"/>
+              <a:rPr lang="en-US" dirty="0" err="1">
+                <a:latin typeface="PT Sans" panose="020B0503020203020204" pitchFamily="34" charset="-52"/>
+              </a:rPr>
               <a:t>și</a:t>
             </a:r>
             <a:r>
-              <a:rPr lang="en-US" dirty="0"/>
-              <a:t> </a:t>
-            </a:r>
-            <a:r>
-              <a:rPr lang="en-US" dirty="0" err="1"/>
+              <a:rPr lang="en-US" dirty="0">
+                <a:latin typeface="PT Sans" panose="020B0503020203020204" pitchFamily="34" charset="-52"/>
+              </a:rPr>
+              <a:t> </a:t>
+            </a:r>
+            <a:r>
+              <a:rPr lang="en-US" dirty="0" err="1">
+                <a:latin typeface="PT Sans" panose="020B0503020203020204" pitchFamily="34" charset="-52"/>
+              </a:rPr>
               <a:t>verificarea</a:t>
             </a:r>
             <a:r>
-              <a:rPr lang="en-US" dirty="0"/>
-              <a:t> </a:t>
-            </a:r>
-            <a:r>
-              <a:rPr lang="en-US" dirty="0" err="1"/>
+              <a:rPr lang="en-US" dirty="0">
+                <a:latin typeface="PT Sans" panose="020B0503020203020204" pitchFamily="34" charset="-52"/>
+              </a:rPr>
+              <a:t> </a:t>
+            </a:r>
+            <a:r>
+              <a:rPr lang="en-US" dirty="0" err="1">
+                <a:latin typeface="PT Sans" panose="020B0503020203020204" pitchFamily="34" charset="-52"/>
+              </a:rPr>
               <a:t>securității</a:t>
             </a:r>
             <a:r>
-              <a:rPr lang="en-US" dirty="0"/>
-              <a:t> </a:t>
-            </a:r>
-            <a:r>
-              <a:rPr lang="en-US" dirty="0" err="1"/>
+              <a:rPr lang="en-US" dirty="0">
+                <a:latin typeface="PT Sans" panose="020B0503020203020204" pitchFamily="34" charset="-52"/>
+              </a:rPr>
+              <a:t> </a:t>
+            </a:r>
+            <a:r>
+              <a:rPr lang="en-US" dirty="0" err="1">
+                <a:latin typeface="PT Sans" panose="020B0503020203020204" pitchFamily="34" charset="-52"/>
+              </a:rPr>
               <a:t>managementului</a:t>
             </a:r>
             <a:r>
-              <a:rPr lang="en-US" dirty="0"/>
-              <a:t> </a:t>
-            </a:r>
-            <a:r>
-              <a:rPr lang="en-US" dirty="0" err="1"/>
+              <a:rPr lang="en-US" dirty="0">
+                <a:latin typeface="PT Sans" panose="020B0503020203020204" pitchFamily="34" charset="-52"/>
+              </a:rPr>
+              <a:t> </a:t>
+            </a:r>
+            <a:r>
+              <a:rPr lang="en-US" dirty="0" err="1">
+                <a:latin typeface="PT Sans" panose="020B0503020203020204" pitchFamily="34" charset="-52"/>
+              </a:rPr>
               <a:t>sesiunii</a:t>
             </a:r>
             <a:r>
-              <a:rPr lang="en-US" dirty="0"/>
-              <a:t> </a:t>
-            </a:r>
-            <a:r>
-              <a:rPr lang="en-US" dirty="0" err="1"/>
+              <a:rPr lang="en-US" dirty="0">
+                <a:latin typeface="PT Sans" panose="020B0503020203020204" pitchFamily="34" charset="-52"/>
+              </a:rPr>
+              <a:t> </a:t>
+            </a:r>
+            <a:r>
+              <a:rPr lang="en-US" dirty="0" err="1">
+                <a:latin typeface="PT Sans" panose="020B0503020203020204" pitchFamily="34" charset="-52"/>
+              </a:rPr>
               <a:t>pentru</a:t>
             </a:r>
             <a:r>
-              <a:rPr lang="en-US" dirty="0"/>
+              <a:rPr lang="en-US" dirty="0">
+                <a:latin typeface="PT Sans" panose="020B0503020203020204" pitchFamily="34" charset="-52"/>
+              </a:rPr>
               <a:t> a </a:t>
             </a:r>
             <a:r>
-              <a:rPr lang="en-US" dirty="0" err="1"/>
+              <a:rPr lang="en-US" dirty="0" err="1">
+                <a:latin typeface="PT Sans" panose="020B0503020203020204" pitchFamily="34" charset="-52"/>
+              </a:rPr>
               <a:t>preveni</a:t>
             </a:r>
             <a:r>
-              <a:rPr lang="en-US" dirty="0"/>
-              <a:t> </a:t>
-            </a:r>
-            <a:r>
-              <a:rPr lang="en-US" dirty="0" err="1"/>
+              <a:rPr lang="en-US" dirty="0">
+                <a:latin typeface="PT Sans" panose="020B0503020203020204" pitchFamily="34" charset="-52"/>
+              </a:rPr>
+              <a:t> </a:t>
+            </a:r>
+            <a:r>
+              <a:rPr lang="en-US" dirty="0" err="1">
+                <a:latin typeface="PT Sans" panose="020B0503020203020204" pitchFamily="34" charset="-52"/>
+              </a:rPr>
               <a:t>atacurile</a:t>
             </a:r>
             <a:r>
-              <a:rPr lang="en-US" dirty="0"/>
+              <a:rPr lang="en-US" dirty="0">
+                <a:latin typeface="PT Sans" panose="020B0503020203020204" pitchFamily="34" charset="-52"/>
+              </a:rPr>
               <a:t> de </a:t>
             </a:r>
             <a:r>
-              <a:rPr lang="en-US" dirty="0" err="1"/>
+              <a:rPr lang="en-US" dirty="0" err="1">
+                <a:latin typeface="PT Sans" panose="020B0503020203020204" pitchFamily="34" charset="-52"/>
+              </a:rPr>
               <a:t>sesiune</a:t>
             </a:r>
             <a:r>
-              <a:rPr lang="en-US" dirty="0"/>
+              <a:rPr lang="en-US" dirty="0">
+                <a:latin typeface="PT Sans" panose="020B0503020203020204" pitchFamily="34" charset="-52"/>
+              </a:rPr>
               <a:t>.</a:t>
             </a:r>
-            <a:endParaRPr lang="ru-RU" dirty="0"/>
+            <a:endParaRPr lang="ru-RU" dirty="0">
+              <a:latin typeface="PT Sans" panose="020B0503020203020204" pitchFamily="34" charset="-52"/>
+            </a:endParaRPr>
           </a:p>
         </p:txBody>
       </p:sp>
@@ -11809,147 +12087,147 @@
               <a:buNone/>
             </a:pPr>
             <a:r>
-              <a:rPr lang="en-US" sz="1600" dirty="0" err="1"/>
+              <a:rPr lang="en-US" sz="1800" dirty="0" err="1"/>
               <a:t>Să</a:t>
             </a:r>
             <a:r>
-              <a:rPr lang="en-US" sz="1600" dirty="0"/>
-              <a:t> </a:t>
-            </a:r>
-            <a:r>
-              <a:rPr lang="en-US" sz="1600" dirty="0" err="1"/>
+              <a:rPr lang="en-US" sz="1800" dirty="0"/>
+              <a:t> </a:t>
+            </a:r>
+            <a:r>
+              <a:rPr lang="en-US" sz="1800" dirty="0" err="1"/>
               <a:t>presupunem</a:t>
             </a:r>
             <a:r>
-              <a:rPr lang="en-US" sz="1600" dirty="0"/>
-              <a:t> </a:t>
-            </a:r>
-            <a:r>
-              <a:rPr lang="en-US" sz="1600" dirty="0" err="1"/>
+              <a:rPr lang="en-US" sz="1800" dirty="0"/>
+              <a:t> </a:t>
+            </a:r>
+            <a:r>
+              <a:rPr lang="en-US" sz="1800" dirty="0" err="1"/>
               <a:t>că</a:t>
             </a:r>
             <a:r>
-              <a:rPr lang="en-US" sz="1600" dirty="0"/>
-              <a:t> </a:t>
-            </a:r>
-            <a:r>
-              <a:rPr lang="en-US" sz="1600" dirty="0" err="1"/>
+              <a:rPr lang="en-US" sz="1800" dirty="0"/>
+              <a:t> </a:t>
+            </a:r>
+            <a:r>
+              <a:rPr lang="en-US" sz="1800" dirty="0" err="1"/>
               <a:t>avem</a:t>
             </a:r>
             <a:r>
-              <a:rPr lang="en-US" sz="1600" dirty="0"/>
+              <a:rPr lang="en-US" sz="1800" dirty="0"/>
               <a:t> o </a:t>
             </a:r>
             <a:r>
-              <a:rPr lang="en-US" sz="1600" dirty="0" err="1"/>
+              <a:rPr lang="en-US" sz="1800" dirty="0" err="1"/>
               <a:t>aplicație</a:t>
             </a:r>
             <a:r>
-              <a:rPr lang="en-US" sz="1600" dirty="0"/>
+              <a:rPr lang="en-US" sz="1800" dirty="0"/>
               <a:t> web de </a:t>
             </a:r>
             <a:r>
-              <a:rPr lang="en-US" sz="1600" dirty="0" err="1"/>
+              <a:rPr lang="en-US" sz="1800" dirty="0" err="1"/>
               <a:t>autentificare</a:t>
             </a:r>
             <a:r>
-              <a:rPr lang="en-US" sz="1600" dirty="0"/>
+              <a:rPr lang="en-US" sz="1800" dirty="0"/>
               <a:t> care </a:t>
             </a:r>
             <a:r>
-              <a:rPr lang="en-US" sz="1600" dirty="0" err="1"/>
+              <a:rPr lang="en-US" sz="1800" dirty="0" err="1"/>
               <a:t>folosește</a:t>
             </a:r>
             <a:r>
-              <a:rPr lang="en-US" sz="1600" dirty="0"/>
+              <a:rPr lang="en-US" sz="1800" dirty="0"/>
               <a:t> o </a:t>
             </a:r>
             <a:r>
-              <a:rPr lang="en-US" sz="1600" dirty="0" err="1"/>
+              <a:rPr lang="en-US" sz="1800" dirty="0" err="1"/>
               <a:t>interogare</a:t>
             </a:r>
             <a:r>
-              <a:rPr lang="en-US" sz="1600" dirty="0"/>
+              <a:rPr lang="en-US" sz="1800" dirty="0"/>
               <a:t> SQL </a:t>
             </a:r>
             <a:r>
-              <a:rPr lang="en-US" sz="1600" dirty="0" err="1"/>
+              <a:rPr lang="en-US" sz="1800" dirty="0" err="1"/>
               <a:t>pentru</a:t>
             </a:r>
             <a:r>
-              <a:rPr lang="en-US" sz="1600" dirty="0"/>
+              <a:rPr lang="en-US" sz="1800" dirty="0"/>
               <a:t> a </a:t>
             </a:r>
             <a:r>
-              <a:rPr lang="en-US" sz="1600" dirty="0" err="1"/>
+              <a:rPr lang="en-US" sz="1800" dirty="0" err="1"/>
               <a:t>verifica</a:t>
             </a:r>
             <a:r>
-              <a:rPr lang="en-US" sz="1600" dirty="0"/>
-              <a:t> </a:t>
-            </a:r>
-            <a:r>
-              <a:rPr lang="en-US" sz="1600" dirty="0" err="1"/>
+              <a:rPr lang="en-US" sz="1800" dirty="0"/>
+              <a:t> </a:t>
+            </a:r>
+            <a:r>
+              <a:rPr lang="en-US" sz="1800" dirty="0" err="1"/>
               <a:t>credențialele</a:t>
             </a:r>
             <a:r>
-              <a:rPr lang="en-US" sz="1600" dirty="0"/>
-              <a:t> </a:t>
-            </a:r>
-            <a:r>
-              <a:rPr lang="en-US" sz="1600" dirty="0" err="1"/>
+              <a:rPr lang="en-US" sz="1800" dirty="0"/>
+              <a:t> </a:t>
+            </a:r>
+            <a:r>
+              <a:rPr lang="en-US" sz="1800" dirty="0" err="1"/>
               <a:t>utilizatorilor</a:t>
             </a:r>
             <a:r>
-              <a:rPr lang="en-US" sz="1600" dirty="0"/>
+              <a:rPr lang="en-US" sz="1800" dirty="0"/>
               <a:t>. </a:t>
             </a:r>
             <a:r>
-              <a:rPr lang="en-US" sz="1600" dirty="0" err="1"/>
+              <a:rPr lang="en-US" sz="1800" dirty="0" err="1"/>
               <a:t>Interogarea</a:t>
             </a:r>
             <a:r>
-              <a:rPr lang="en-US" sz="1600" dirty="0"/>
+              <a:rPr lang="en-US" sz="1800" dirty="0"/>
               <a:t> SQL </a:t>
             </a:r>
             <a:r>
-              <a:rPr lang="en-US" sz="1600" dirty="0" err="1"/>
+              <a:rPr lang="en-US" sz="1800" dirty="0" err="1"/>
               <a:t>ar</a:t>
             </a:r>
             <a:r>
-              <a:rPr lang="en-US" sz="1600" dirty="0"/>
-              <a:t> </a:t>
-            </a:r>
-            <a:r>
-              <a:rPr lang="en-US" sz="1600" dirty="0" err="1"/>
+              <a:rPr lang="en-US" sz="1800" dirty="0"/>
+              <a:t> </a:t>
+            </a:r>
+            <a:r>
+              <a:rPr lang="en-US" sz="1800" dirty="0" err="1"/>
               <a:t>putea</a:t>
             </a:r>
             <a:r>
-              <a:rPr lang="en-US" sz="1600" dirty="0"/>
-              <a:t> </a:t>
-            </a:r>
-            <a:r>
-              <a:rPr lang="en-US" sz="1600" dirty="0" err="1"/>
+              <a:rPr lang="en-US" sz="1800" dirty="0"/>
+              <a:t> </a:t>
+            </a:r>
+            <a:r>
+              <a:rPr lang="en-US" sz="1800" dirty="0" err="1"/>
               <a:t>arăta</a:t>
             </a:r>
             <a:r>
-              <a:rPr lang="en-US" sz="1600" dirty="0"/>
-              <a:t> </a:t>
-            </a:r>
-            <a:r>
-              <a:rPr lang="en-US" sz="1600" dirty="0" err="1"/>
+              <a:rPr lang="en-US" sz="1800" dirty="0"/>
+              <a:t> </a:t>
+            </a:r>
+            <a:r>
+              <a:rPr lang="en-US" sz="1800" dirty="0" err="1"/>
               <a:t>ceva</a:t>
             </a:r>
             <a:r>
-              <a:rPr lang="en-US" sz="1600" dirty="0"/>
+              <a:rPr lang="en-US" sz="1800" dirty="0"/>
               <a:t> de </a:t>
             </a:r>
             <a:r>
-              <a:rPr lang="en-US" sz="1600" dirty="0" err="1"/>
+              <a:rPr lang="en-US" sz="1800" dirty="0" err="1"/>
               <a:t>genul</a:t>
             </a:r>
             <a:r>
-              <a:rPr lang="en-US" sz="1600" dirty="0"/>
+              <a:rPr lang="en-US" sz="1800" dirty="0"/>
               <a:t>:</a:t>
             </a:r>
           </a:p>
@@ -11999,106 +12277,106 @@
               <a:buNone/>
             </a:pPr>
             <a:r>
-              <a:rPr lang="en-US" sz="1600" dirty="0"/>
+              <a:rPr lang="en-US" sz="1800" dirty="0"/>
               <a:t>Un </a:t>
             </a:r>
             <a:r>
-              <a:rPr lang="en-US" sz="1600" dirty="0" err="1"/>
+              <a:rPr lang="en-US" sz="1800" dirty="0" err="1"/>
               <a:t>atacator</a:t>
             </a:r>
             <a:r>
-              <a:rPr lang="en-US" sz="1600" dirty="0"/>
-              <a:t> </a:t>
-            </a:r>
-            <a:r>
-              <a:rPr lang="en-US" sz="1600" dirty="0" err="1"/>
+              <a:rPr lang="en-US" sz="1800" dirty="0"/>
+              <a:t> </a:t>
+            </a:r>
+            <a:r>
+              <a:rPr lang="en-US" sz="1800" dirty="0" err="1"/>
               <a:t>ar</a:t>
             </a:r>
             <a:r>
-              <a:rPr lang="en-US" sz="1600" dirty="0"/>
-              <a:t> </a:t>
-            </a:r>
-            <a:r>
-              <a:rPr lang="en-US" sz="1600" dirty="0" err="1"/>
+              <a:rPr lang="en-US" sz="1800" dirty="0"/>
+              <a:t> </a:t>
+            </a:r>
+            <a:r>
+              <a:rPr lang="en-US" sz="1800" dirty="0" err="1"/>
               <a:t>putea</a:t>
             </a:r>
             <a:r>
-              <a:rPr lang="en-US" sz="1600" dirty="0"/>
-              <a:t> </a:t>
-            </a:r>
-            <a:r>
-              <a:rPr lang="en-US" sz="1600" dirty="0" err="1"/>
+              <a:rPr lang="en-US" sz="1800" dirty="0"/>
+              <a:t> </a:t>
+            </a:r>
+            <a:r>
+              <a:rPr lang="en-US" sz="1800" dirty="0" err="1"/>
               <a:t>insera</a:t>
             </a:r>
             <a:r>
-              <a:rPr lang="en-US" sz="1600" dirty="0"/>
+              <a:rPr lang="en-US" sz="1800" dirty="0"/>
               <a:t> o </a:t>
             </a:r>
             <a:r>
-              <a:rPr lang="en-US" sz="1600" dirty="0" err="1"/>
+              <a:rPr lang="en-US" sz="1800" dirty="0" err="1"/>
               <a:t>instrucțiune</a:t>
             </a:r>
             <a:r>
-              <a:rPr lang="en-US" sz="1600" dirty="0"/>
+              <a:rPr lang="en-US" sz="1800" dirty="0"/>
               <a:t> SQL </a:t>
             </a:r>
             <a:r>
-              <a:rPr lang="en-US" sz="1600" dirty="0" err="1"/>
+              <a:rPr lang="en-US" sz="1800" dirty="0" err="1"/>
               <a:t>malitioasă</a:t>
             </a:r>
             <a:r>
-              <a:rPr lang="en-US" sz="1600" dirty="0"/>
-              <a:t> </a:t>
-            </a:r>
-            <a:r>
-              <a:rPr lang="en-US" sz="1600" dirty="0" err="1"/>
+              <a:rPr lang="en-US" sz="1800" dirty="0"/>
+              <a:t> </a:t>
+            </a:r>
+            <a:r>
+              <a:rPr lang="en-US" sz="1800" dirty="0" err="1"/>
               <a:t>în</a:t>
             </a:r>
             <a:r>
-              <a:rPr lang="en-US" sz="1600" dirty="0"/>
-              <a:t> </a:t>
-            </a:r>
-            <a:r>
-              <a:rPr lang="en-US" sz="1600" dirty="0" err="1"/>
+              <a:rPr lang="en-US" sz="1800" dirty="0"/>
+              <a:t> </a:t>
+            </a:r>
+            <a:r>
+              <a:rPr lang="en-US" sz="1800" dirty="0" err="1"/>
               <a:t>câmpul</a:t>
             </a:r>
             <a:r>
-              <a:rPr lang="en-US" sz="1600" dirty="0"/>
+              <a:rPr lang="en-US" sz="1800" dirty="0"/>
               <a:t> de </a:t>
             </a:r>
             <a:r>
-              <a:rPr lang="en-US" sz="1600" dirty="0" err="1"/>
+              <a:rPr lang="en-US" sz="1800" dirty="0" err="1"/>
               <a:t>autentificare</a:t>
             </a:r>
             <a:r>
-              <a:rPr lang="en-US" sz="1600" dirty="0"/>
-              <a:t> </a:t>
-            </a:r>
-            <a:r>
-              <a:rPr lang="en-US" sz="1600" dirty="0" err="1"/>
+              <a:rPr lang="en-US" sz="1800" dirty="0"/>
+              <a:t> </a:t>
+            </a:r>
+            <a:r>
+              <a:rPr lang="en-US" sz="1800" dirty="0" err="1"/>
               <a:t>pentru</a:t>
             </a:r>
             <a:r>
-              <a:rPr lang="en-US" sz="1600" dirty="0"/>
-              <a:t> </a:t>
-            </a:r>
-            <a:r>
-              <a:rPr lang="en-US" sz="1600" dirty="0" err="1"/>
+              <a:rPr lang="en-US" sz="1800" dirty="0"/>
+              <a:t> </a:t>
+            </a:r>
+            <a:r>
+              <a:rPr lang="en-US" sz="1800" dirty="0" err="1"/>
               <a:t>parolă</a:t>
             </a:r>
             <a:r>
-              <a:rPr lang="en-US" sz="1600" dirty="0"/>
+              <a:rPr lang="en-US" sz="1800" dirty="0"/>
               <a:t>, cum </a:t>
             </a:r>
             <a:r>
-              <a:rPr lang="en-US" sz="1600" dirty="0" err="1"/>
+              <a:rPr lang="en-US" sz="1800" dirty="0" err="1"/>
               <a:t>ar</a:t>
             </a:r>
             <a:r>
-              <a:rPr lang="en-US" sz="1600" dirty="0"/>
+              <a:rPr lang="en-US" sz="1800" dirty="0"/>
               <a:t> fi:</a:t>
             </a:r>
-            <a:endParaRPr lang="en-US" sz="1600" b="1" dirty="0"/>
+            <a:endParaRPr lang="en-US" sz="1800" b="1" dirty="0"/>
           </a:p>
           <a:p>
             <a:pPr marL="0" indent="0" algn="ctr">
@@ -16082,7 +16360,7 @@
                   <a:srgbClr val="242438"/>
                 </a:solidFill>
                 <a:effectLst/>
-                <a:latin typeface="Roboto" panose="02000000000000000000" pitchFamily="2" charset="0"/>
+                <a:latin typeface="PT Sans" panose="020B0503020203020204" pitchFamily="34" charset="-52"/>
               </a:rPr>
               <a:t>Rețineți</a:t>
             </a:r>
@@ -16092,17 +16370,17 @@
                   <a:srgbClr val="242438"/>
                 </a:solidFill>
                 <a:effectLst/>
-                <a:latin typeface="Roboto" panose="02000000000000000000" pitchFamily="2" charset="0"/>
-              </a:rPr>
-              <a:t> </a:t>
-            </a:r>
-            <a:r>
-              <a:rPr lang="en-US" sz="1800" b="0" i="0" dirty="0" err="1">
-                <a:solidFill>
-                  <a:srgbClr val="242438"/>
-                </a:solidFill>
-                <a:effectLst/>
-                <a:latin typeface="Roboto" panose="02000000000000000000" pitchFamily="2" charset="0"/>
+                <a:latin typeface="PT Sans" panose="020B0503020203020204" pitchFamily="34" charset="-52"/>
+              </a:rPr>
+              <a:t> </a:t>
+            </a:r>
+            <a:r>
+              <a:rPr lang="en-US" sz="1800" b="0" i="0" dirty="0" err="1">
+                <a:solidFill>
+                  <a:srgbClr val="242438"/>
+                </a:solidFill>
+                <a:effectLst/>
+                <a:latin typeface="PT Sans" panose="020B0503020203020204" pitchFamily="34" charset="-52"/>
               </a:rPr>
               <a:t>că</a:t>
             </a:r>
@@ -16112,17 +16390,17 @@
                   <a:srgbClr val="242438"/>
                 </a:solidFill>
                 <a:effectLst/>
-                <a:latin typeface="Roboto" panose="02000000000000000000" pitchFamily="2" charset="0"/>
-              </a:rPr>
-              <a:t> </a:t>
-            </a:r>
-            <a:r>
-              <a:rPr lang="en-US" sz="1800" b="0" i="0" dirty="0" err="1">
-                <a:solidFill>
-                  <a:srgbClr val="242438"/>
-                </a:solidFill>
-                <a:effectLst/>
-                <a:latin typeface="Roboto" panose="02000000000000000000" pitchFamily="2" charset="0"/>
+                <a:latin typeface="PT Sans" panose="020B0503020203020204" pitchFamily="34" charset="-52"/>
+              </a:rPr>
+              <a:t> </a:t>
+            </a:r>
+            <a:r>
+              <a:rPr lang="en-US" sz="1800" b="0" i="0" dirty="0" err="1">
+                <a:solidFill>
+                  <a:srgbClr val="242438"/>
+                </a:solidFill>
+                <a:effectLst/>
+                <a:latin typeface="PT Sans" panose="020B0503020203020204" pitchFamily="34" charset="-52"/>
               </a:rPr>
               <a:t>folosim</a:t>
             </a:r>
@@ -16132,7 +16410,7 @@
                   <a:srgbClr val="242438"/>
                 </a:solidFill>
                 <a:effectLst/>
-                <a:latin typeface="Roboto" panose="02000000000000000000" pitchFamily="2" charset="0"/>
+                <a:latin typeface="PT Sans" panose="020B0503020203020204" pitchFamily="34" charset="-52"/>
               </a:rPr>
               <a:t> iframe, care </a:t>
             </a:r>
@@ -16142,7 +16420,7 @@
                   <a:srgbClr val="242438"/>
                 </a:solidFill>
                 <a:effectLst/>
-                <a:latin typeface="Roboto" panose="02000000000000000000" pitchFamily="2" charset="0"/>
+                <a:latin typeface="PT Sans" panose="020B0503020203020204" pitchFamily="34" charset="-52"/>
               </a:rPr>
               <a:t>este</a:t>
             </a:r>
@@ -16152,7 +16430,7 @@
                   <a:srgbClr val="242438"/>
                 </a:solidFill>
                 <a:effectLst/>
-                <a:latin typeface="Roboto" panose="02000000000000000000" pitchFamily="2" charset="0"/>
+                <a:latin typeface="PT Sans" panose="020B0503020203020204" pitchFamily="34" charset="-52"/>
               </a:rPr>
               <a:t> un element </a:t>
             </a:r>
@@ -16162,7 +16440,7 @@
                   <a:srgbClr val="242438"/>
                 </a:solidFill>
                 <a:effectLst/>
-                <a:latin typeface="Roboto" panose="02000000000000000000" pitchFamily="2" charset="0"/>
+                <a:latin typeface="PT Sans" panose="020B0503020203020204" pitchFamily="34" charset="-52"/>
               </a:rPr>
               <a:t>comun</a:t>
             </a:r>
@@ -16172,7 +16450,7 @@
                   <a:srgbClr val="242438"/>
                 </a:solidFill>
                 <a:effectLst/>
-                <a:latin typeface="Roboto" panose="02000000000000000000" pitchFamily="2" charset="0"/>
+                <a:latin typeface="PT Sans" panose="020B0503020203020204" pitchFamily="34" charset="-52"/>
               </a:rPr>
               <a:t> HTML </a:t>
             </a:r>
@@ -16182,7 +16460,7 @@
                   <a:srgbClr val="242438"/>
                 </a:solidFill>
                 <a:effectLst/>
-                <a:latin typeface="Roboto" panose="02000000000000000000" pitchFamily="2" charset="0"/>
+                <a:latin typeface="PT Sans" panose="020B0503020203020204" pitchFamily="34" charset="-52"/>
               </a:rPr>
               <a:t>găsit</a:t>
             </a:r>
@@ -16192,17 +16470,17 @@
                   <a:srgbClr val="242438"/>
                 </a:solidFill>
                 <a:effectLst/>
-                <a:latin typeface="Roboto" panose="02000000000000000000" pitchFamily="2" charset="0"/>
-              </a:rPr>
-              <a:t> </a:t>
-            </a:r>
-            <a:r>
-              <a:rPr lang="en-US" sz="1800" b="0" i="0" dirty="0" err="1">
-                <a:solidFill>
-                  <a:srgbClr val="242438"/>
-                </a:solidFill>
-                <a:effectLst/>
-                <a:latin typeface="Roboto" panose="02000000000000000000" pitchFamily="2" charset="0"/>
+                <a:latin typeface="PT Sans" panose="020B0503020203020204" pitchFamily="34" charset="-52"/>
+              </a:rPr>
+              <a:t> </a:t>
+            </a:r>
+            <a:r>
+              <a:rPr lang="en-US" sz="1800" b="0" i="0" dirty="0" err="1">
+                <a:solidFill>
+                  <a:srgbClr val="242438"/>
+                </a:solidFill>
+                <a:effectLst/>
+                <a:latin typeface="PT Sans" panose="020B0503020203020204" pitchFamily="34" charset="-52"/>
               </a:rPr>
               <a:t>în</a:t>
             </a:r>
@@ -16212,17 +16490,17 @@
                   <a:srgbClr val="242438"/>
                 </a:solidFill>
                 <a:effectLst/>
-                <a:latin typeface="Roboto" panose="02000000000000000000" pitchFamily="2" charset="0"/>
-              </a:rPr>
-              <a:t> </a:t>
-            </a:r>
-            <a:r>
-              <a:rPr lang="en-US" sz="1800" b="0" i="0" dirty="0" err="1">
-                <a:solidFill>
-                  <a:srgbClr val="242438"/>
-                </a:solidFill>
-                <a:effectLst/>
-                <a:latin typeface="Roboto" panose="02000000000000000000" pitchFamily="2" charset="0"/>
+                <a:latin typeface="PT Sans" panose="020B0503020203020204" pitchFamily="34" charset="-52"/>
+              </a:rPr>
+              <a:t> </a:t>
+            </a:r>
+            <a:r>
+              <a:rPr lang="en-US" sz="1800" b="0" i="0" dirty="0" err="1">
+                <a:solidFill>
+                  <a:srgbClr val="242438"/>
+                </a:solidFill>
+                <a:effectLst/>
+                <a:latin typeface="PT Sans" panose="020B0503020203020204" pitchFamily="34" charset="-52"/>
               </a:rPr>
               <a:t>multe</a:t>
             </a:r>
@@ -16232,17 +16510,17 @@
                   <a:srgbClr val="242438"/>
                 </a:solidFill>
                 <a:effectLst/>
-                <a:latin typeface="Roboto" panose="02000000000000000000" pitchFamily="2" charset="0"/>
-              </a:rPr>
-              <a:t> </a:t>
-            </a:r>
-            <a:r>
-              <a:rPr lang="en-US" sz="1800" b="0" i="0" dirty="0" err="1">
-                <a:solidFill>
-                  <a:srgbClr val="242438"/>
-                </a:solidFill>
-                <a:effectLst/>
-                <a:latin typeface="Roboto" panose="02000000000000000000" pitchFamily="2" charset="0"/>
+                <a:latin typeface="PT Sans" panose="020B0503020203020204" pitchFamily="34" charset="-52"/>
+              </a:rPr>
+              <a:t> </a:t>
+            </a:r>
+            <a:r>
+              <a:rPr lang="en-US" sz="1800" b="0" i="0" dirty="0" err="1">
+                <a:solidFill>
+                  <a:srgbClr val="242438"/>
+                </a:solidFill>
+                <a:effectLst/>
+                <a:latin typeface="PT Sans" panose="020B0503020203020204" pitchFamily="34" charset="-52"/>
               </a:rPr>
               <a:t>aplicații</a:t>
             </a:r>
@@ -16252,7 +16530,7 @@
                   <a:srgbClr val="242438"/>
                 </a:solidFill>
                 <a:effectLst/>
-                <a:latin typeface="Roboto" panose="02000000000000000000" pitchFamily="2" charset="0"/>
+                <a:latin typeface="PT Sans" panose="020B0503020203020204" pitchFamily="34" charset="-52"/>
               </a:rPr>
               <a:t> web, </a:t>
             </a:r>
@@ -16262,7 +16540,7 @@
                   <a:srgbClr val="242438"/>
                 </a:solidFill>
                 <a:effectLst/>
-                <a:latin typeface="Roboto" panose="02000000000000000000" pitchFamily="2" charset="0"/>
+                <a:latin typeface="PT Sans" panose="020B0503020203020204" pitchFamily="34" charset="-52"/>
               </a:rPr>
               <a:t>există</a:t>
             </a:r>
@@ -16272,17 +16550,17 @@
                   <a:srgbClr val="242438"/>
                 </a:solidFill>
                 <a:effectLst/>
-                <a:latin typeface="Roboto" panose="02000000000000000000" pitchFamily="2" charset="0"/>
-              </a:rPr>
-              <a:t> </a:t>
-            </a:r>
-            <a:r>
-              <a:rPr lang="en-US" sz="1800" b="0" i="0" dirty="0" err="1">
-                <a:solidFill>
-                  <a:srgbClr val="242438"/>
-                </a:solidFill>
-                <a:effectLst/>
-                <a:latin typeface="Roboto" panose="02000000000000000000" pitchFamily="2" charset="0"/>
+                <a:latin typeface="PT Sans" panose="020B0503020203020204" pitchFamily="34" charset="-52"/>
+              </a:rPr>
+              <a:t> </a:t>
+            </a:r>
+            <a:r>
+              <a:rPr lang="en-US" sz="1800" b="0" i="0" dirty="0" err="1">
+                <a:solidFill>
+                  <a:srgbClr val="242438"/>
+                </a:solidFill>
+                <a:effectLst/>
+                <a:latin typeface="PT Sans" panose="020B0503020203020204" pitchFamily="34" charset="-52"/>
               </a:rPr>
               <a:t>și</a:t>
             </a:r>
@@ -16292,17 +16570,17 @@
                   <a:srgbClr val="242438"/>
                 </a:solidFill>
                 <a:effectLst/>
-                <a:latin typeface="Roboto" panose="02000000000000000000" pitchFamily="2" charset="0"/>
-              </a:rPr>
-              <a:t> </a:t>
-            </a:r>
-            <a:r>
-              <a:rPr lang="en-US" sz="1800" b="0" i="0" dirty="0" err="1">
-                <a:solidFill>
-                  <a:srgbClr val="242438"/>
-                </a:solidFill>
-                <a:effectLst/>
-                <a:latin typeface="Roboto" panose="02000000000000000000" pitchFamily="2" charset="0"/>
+                <a:latin typeface="PT Sans" panose="020B0503020203020204" pitchFamily="34" charset="-52"/>
+              </a:rPr>
+              <a:t> </a:t>
+            </a:r>
+            <a:r>
+              <a:rPr lang="en-US" sz="1800" b="0" i="0" dirty="0" err="1">
+                <a:solidFill>
+                  <a:srgbClr val="242438"/>
+                </a:solidFill>
+                <a:effectLst/>
+                <a:latin typeface="PT Sans" panose="020B0503020203020204" pitchFamily="34" charset="-52"/>
               </a:rPr>
               <a:t>altele</a:t>
             </a:r>
@@ -16312,7 +16590,7 @@
                   <a:srgbClr val="242438"/>
                 </a:solidFill>
                 <a:effectLst/>
-                <a:latin typeface="Roboto" panose="02000000000000000000" pitchFamily="2" charset="0"/>
+                <a:latin typeface="PT Sans" panose="020B0503020203020204" pitchFamily="34" charset="-52"/>
               </a:rPr>
               <a:t> care </a:t>
             </a:r>
@@ -16322,7 +16600,7 @@
                   <a:srgbClr val="242438"/>
                 </a:solidFill>
                 <a:effectLst/>
-                <a:latin typeface="Roboto" panose="02000000000000000000" pitchFamily="2" charset="0"/>
+                <a:latin typeface="PT Sans" panose="020B0503020203020204" pitchFamily="34" charset="-52"/>
               </a:rPr>
               <a:t>produc</a:t>
             </a:r>
@@ -16332,17 +16610,17 @@
                   <a:srgbClr val="242438"/>
                 </a:solidFill>
                 <a:effectLst/>
-                <a:latin typeface="Roboto" panose="02000000000000000000" pitchFamily="2" charset="0"/>
-              </a:rPr>
-              <a:t> </a:t>
-            </a:r>
-            <a:r>
-              <a:rPr lang="en-US" sz="1800" b="0" i="0" dirty="0" err="1">
-                <a:solidFill>
-                  <a:srgbClr val="242438"/>
-                </a:solidFill>
-                <a:effectLst/>
-                <a:latin typeface="Roboto" panose="02000000000000000000" pitchFamily="2" charset="0"/>
+                <a:latin typeface="PT Sans" panose="020B0503020203020204" pitchFamily="34" charset="-52"/>
+              </a:rPr>
+              <a:t> </a:t>
+            </a:r>
+            <a:r>
+              <a:rPr lang="en-US" sz="1800" b="0" i="0" dirty="0" err="1">
+                <a:solidFill>
+                  <a:srgbClr val="242438"/>
+                </a:solidFill>
+                <a:effectLst/>
+                <a:latin typeface="PT Sans" panose="020B0503020203020204" pitchFamily="34" charset="-52"/>
               </a:rPr>
               <a:t>același</a:t>
             </a:r>
@@ -16352,17 +16630,17 @@
                   <a:srgbClr val="242438"/>
                 </a:solidFill>
                 <a:effectLst/>
-                <a:latin typeface="Roboto" panose="02000000000000000000" pitchFamily="2" charset="0"/>
-              </a:rPr>
-              <a:t> </a:t>
-            </a:r>
-            <a:r>
-              <a:rPr lang="en-US" sz="1800" b="0" i="0" dirty="0" err="1">
-                <a:solidFill>
-                  <a:srgbClr val="242438"/>
-                </a:solidFill>
-                <a:effectLst/>
-                <a:latin typeface="Roboto" panose="02000000000000000000" pitchFamily="2" charset="0"/>
+                <a:latin typeface="PT Sans" panose="020B0503020203020204" pitchFamily="34" charset="-52"/>
+              </a:rPr>
+              <a:t> </a:t>
+            </a:r>
+            <a:r>
+              <a:rPr lang="en-US" sz="1800" b="0" i="0" dirty="0" err="1">
+                <a:solidFill>
+                  <a:srgbClr val="242438"/>
+                </a:solidFill>
+                <a:effectLst/>
+                <a:latin typeface="PT Sans" panose="020B0503020203020204" pitchFamily="34" charset="-52"/>
               </a:rPr>
               <a:t>rezultat</a:t>
             </a:r>
@@ -16372,7 +16650,7 @@
                   <a:srgbClr val="242438"/>
                 </a:solidFill>
                 <a:effectLst/>
-                <a:latin typeface="Roboto" panose="02000000000000000000" pitchFamily="2" charset="0"/>
+                <a:latin typeface="PT Sans" panose="020B0503020203020204" pitchFamily="34" charset="-52"/>
               </a:rPr>
               <a:t>. </a:t>
             </a:r>
@@ -16382,7 +16660,7 @@
                   <a:srgbClr val="242438"/>
                 </a:solidFill>
                 <a:effectLst/>
-                <a:latin typeface="Roboto" panose="02000000000000000000" pitchFamily="2" charset="0"/>
+                <a:latin typeface="PT Sans" panose="020B0503020203020204" pitchFamily="34" charset="-52"/>
               </a:rPr>
               <a:t>Acest</a:t>
             </a:r>
@@ -16392,7 +16670,7 @@
                   <a:srgbClr val="242438"/>
                 </a:solidFill>
                 <a:effectLst/>
-                <a:latin typeface="Roboto" panose="02000000000000000000" pitchFamily="2" charset="0"/>
+                <a:latin typeface="PT Sans" panose="020B0503020203020204" pitchFamily="34" charset="-52"/>
               </a:rPr>
               <a:t> tip de XSS </a:t>
             </a:r>
@@ -16402,7 +16680,7 @@
                   <a:srgbClr val="242438"/>
                 </a:solidFill>
                 <a:effectLst/>
-                <a:latin typeface="Roboto" panose="02000000000000000000" pitchFamily="2" charset="0"/>
+                <a:latin typeface="PT Sans" panose="020B0503020203020204" pitchFamily="34" charset="-52"/>
               </a:rPr>
               <a:t>este</a:t>
             </a:r>
@@ -16412,7 +16690,7 @@
                   <a:srgbClr val="242438"/>
                 </a:solidFill>
                 <a:effectLst/>
-                <a:latin typeface="Roboto" panose="02000000000000000000" pitchFamily="2" charset="0"/>
+                <a:latin typeface="PT Sans" panose="020B0503020203020204" pitchFamily="34" charset="-52"/>
               </a:rPr>
               <a:t>, de </a:t>
             </a:r>
@@ -16422,7 +16700,7 @@
                   <a:srgbClr val="242438"/>
                 </a:solidFill>
                 <a:effectLst/>
-                <a:latin typeface="Roboto" panose="02000000000000000000" pitchFamily="2" charset="0"/>
+                <a:latin typeface="PT Sans" panose="020B0503020203020204" pitchFamily="34" charset="-52"/>
               </a:rPr>
               <a:t>asemenea</a:t>
             </a:r>
@@ -16432,7 +16710,7 @@
                   <a:srgbClr val="242438"/>
                 </a:solidFill>
                 <a:effectLst/>
-                <a:latin typeface="Roboto" panose="02000000000000000000" pitchFamily="2" charset="0"/>
+                <a:latin typeface="PT Sans" panose="020B0503020203020204" pitchFamily="34" charset="-52"/>
               </a:rPr>
               <a:t>, </a:t>
             </a:r>
@@ -16442,7 +16720,7 @@
                   <a:srgbClr val="242438"/>
                 </a:solidFill>
                 <a:effectLst/>
-                <a:latin typeface="Roboto" panose="02000000000000000000" pitchFamily="2" charset="0"/>
+                <a:latin typeface="PT Sans" panose="020B0503020203020204" pitchFamily="34" charset="-52"/>
               </a:rPr>
               <a:t>numit</a:t>
             </a:r>
@@ -16452,7 +16730,7 @@
                   <a:srgbClr val="242438"/>
                 </a:solidFill>
                 <a:effectLst/>
-                <a:latin typeface="Roboto" panose="02000000000000000000" pitchFamily="2" charset="0"/>
+                <a:latin typeface="PT Sans" panose="020B0503020203020204" pitchFamily="34" charset="-52"/>
               </a:rPr>
               <a:t> XFS (Cross-Frame Scripting), </a:t>
             </a:r>
@@ -16462,7 +16740,7 @@
                   <a:srgbClr val="242438"/>
                 </a:solidFill>
                 <a:effectLst/>
-                <a:latin typeface="Roboto" panose="02000000000000000000" pitchFamily="2" charset="0"/>
+                <a:latin typeface="PT Sans" panose="020B0503020203020204" pitchFamily="34" charset="-52"/>
               </a:rPr>
               <a:t>este</a:t>
             </a:r>
@@ -16472,7 +16750,7 @@
                   <a:srgbClr val="242438"/>
                 </a:solidFill>
                 <a:effectLst/>
-                <a:latin typeface="Roboto" panose="02000000000000000000" pitchFamily="2" charset="0"/>
+                <a:latin typeface="PT Sans" panose="020B0503020203020204" pitchFamily="34" charset="-52"/>
               </a:rPr>
               <a:t> una </a:t>
             </a:r>
@@ -16482,7 +16760,7 @@
                   <a:srgbClr val="242438"/>
                 </a:solidFill>
                 <a:effectLst/>
-                <a:latin typeface="Roboto" panose="02000000000000000000" pitchFamily="2" charset="0"/>
+                <a:latin typeface="PT Sans" panose="020B0503020203020204" pitchFamily="34" charset="-52"/>
               </a:rPr>
               <a:t>dintre</a:t>
             </a:r>
@@ -16492,17 +16770,17 @@
                   <a:srgbClr val="242438"/>
                 </a:solidFill>
                 <a:effectLst/>
-                <a:latin typeface="Roboto" panose="02000000000000000000" pitchFamily="2" charset="0"/>
-              </a:rPr>
-              <a:t> </a:t>
-            </a:r>
-            <a:r>
-              <a:rPr lang="en-US" sz="1800" b="0" i="0" dirty="0" err="1">
-                <a:solidFill>
-                  <a:srgbClr val="242438"/>
-                </a:solidFill>
-                <a:effectLst/>
-                <a:latin typeface="Roboto" panose="02000000000000000000" pitchFamily="2" charset="0"/>
+                <a:latin typeface="PT Sans" panose="020B0503020203020204" pitchFamily="34" charset="-52"/>
+              </a:rPr>
+              <a:t> </a:t>
+            </a:r>
+            <a:r>
+              <a:rPr lang="en-US" sz="1800" b="0" i="0" dirty="0" err="1">
+                <a:solidFill>
+                  <a:srgbClr val="242438"/>
+                </a:solidFill>
+                <a:effectLst/>
+                <a:latin typeface="PT Sans" panose="020B0503020203020204" pitchFamily="34" charset="-52"/>
               </a:rPr>
               <a:t>cele</a:t>
             </a:r>
@@ -16512,17 +16790,17 @@
                   <a:srgbClr val="242438"/>
                 </a:solidFill>
                 <a:effectLst/>
-                <a:latin typeface="Roboto" panose="02000000000000000000" pitchFamily="2" charset="0"/>
-              </a:rPr>
-              <a:t> </a:t>
-            </a:r>
-            <a:r>
-              <a:rPr lang="en-US" sz="1800" b="0" i="0" dirty="0" err="1">
-                <a:solidFill>
-                  <a:srgbClr val="242438"/>
-                </a:solidFill>
-                <a:effectLst/>
-                <a:latin typeface="Roboto" panose="02000000000000000000" pitchFamily="2" charset="0"/>
+                <a:latin typeface="PT Sans" panose="020B0503020203020204" pitchFamily="34" charset="-52"/>
+              </a:rPr>
+              <a:t> </a:t>
+            </a:r>
+            <a:r>
+              <a:rPr lang="en-US" sz="1800" b="0" i="0" dirty="0" err="1">
+                <a:solidFill>
+                  <a:srgbClr val="242438"/>
+                </a:solidFill>
+                <a:effectLst/>
+                <a:latin typeface="PT Sans" panose="020B0503020203020204" pitchFamily="34" charset="-52"/>
               </a:rPr>
               <a:t>mai</a:t>
             </a:r>
@@ -16532,17 +16810,17 @@
                   <a:srgbClr val="242438"/>
                 </a:solidFill>
                 <a:effectLst/>
-                <a:latin typeface="Roboto" panose="02000000000000000000" pitchFamily="2" charset="0"/>
-              </a:rPr>
-              <a:t> </a:t>
-            </a:r>
-            <a:r>
-              <a:rPr lang="en-US" sz="1800" b="0" i="0" dirty="0" err="1">
-                <a:solidFill>
-                  <a:srgbClr val="242438"/>
-                </a:solidFill>
-                <a:effectLst/>
-                <a:latin typeface="Roboto" panose="02000000000000000000" pitchFamily="2" charset="0"/>
+                <a:latin typeface="PT Sans" panose="020B0503020203020204" pitchFamily="34" charset="-52"/>
+              </a:rPr>
+              <a:t> </a:t>
+            </a:r>
+            <a:r>
+              <a:rPr lang="en-US" sz="1800" b="0" i="0" dirty="0" err="1">
+                <a:solidFill>
+                  <a:srgbClr val="242438"/>
+                </a:solidFill>
+                <a:effectLst/>
+                <a:latin typeface="PT Sans" panose="020B0503020203020204" pitchFamily="34" charset="-52"/>
               </a:rPr>
               <a:t>comune</a:t>
             </a:r>
@@ -16552,17 +16830,17 @@
                   <a:srgbClr val="242438"/>
                 </a:solidFill>
                 <a:effectLst/>
-                <a:latin typeface="Roboto" panose="02000000000000000000" pitchFamily="2" charset="0"/>
-              </a:rPr>
-              <a:t> </a:t>
-            </a:r>
-            <a:r>
-              <a:rPr lang="en-US" sz="1800" b="0" i="0" dirty="0" err="1">
-                <a:solidFill>
-                  <a:srgbClr val="242438"/>
-                </a:solidFill>
-                <a:effectLst/>
-                <a:latin typeface="Roboto" panose="02000000000000000000" pitchFamily="2" charset="0"/>
+                <a:latin typeface="PT Sans" panose="020B0503020203020204" pitchFamily="34" charset="-52"/>
+              </a:rPr>
+              <a:t> </a:t>
+            </a:r>
+            <a:r>
+              <a:rPr lang="en-US" sz="1800" b="0" i="0" dirty="0" err="1">
+                <a:solidFill>
+                  <a:srgbClr val="242438"/>
+                </a:solidFill>
+                <a:effectLst/>
+                <a:latin typeface="PT Sans" panose="020B0503020203020204" pitchFamily="34" charset="-52"/>
               </a:rPr>
               <a:t>forme</a:t>
             </a:r>
@@ -16572,7 +16850,7 @@
                   <a:srgbClr val="242438"/>
                 </a:solidFill>
                 <a:effectLst/>
-                <a:latin typeface="Roboto" panose="02000000000000000000" pitchFamily="2" charset="0"/>
+                <a:latin typeface="PT Sans" panose="020B0503020203020204" pitchFamily="34" charset="-52"/>
               </a:rPr>
               <a:t> de </a:t>
             </a:r>
@@ -16582,7 +16860,7 @@
                   <a:srgbClr val="242438"/>
                 </a:solidFill>
                 <a:effectLst/>
-                <a:latin typeface="Roboto" panose="02000000000000000000" pitchFamily="2" charset="0"/>
+                <a:latin typeface="PT Sans" panose="020B0503020203020204" pitchFamily="34" charset="-52"/>
               </a:rPr>
               <a:t>detectare</a:t>
             </a:r>
@@ -16592,7 +16870,7 @@
                   <a:srgbClr val="242438"/>
                 </a:solidFill>
                 <a:effectLst/>
-                <a:latin typeface="Roboto" panose="02000000000000000000" pitchFamily="2" charset="0"/>
+                <a:latin typeface="PT Sans" panose="020B0503020203020204" pitchFamily="34" charset="-52"/>
               </a:rPr>
               <a:t> a XSS </a:t>
             </a:r>
@@ -16602,7 +16880,7 @@
                   <a:srgbClr val="242438"/>
                 </a:solidFill>
                 <a:effectLst/>
-                <a:latin typeface="Roboto" panose="02000000000000000000" pitchFamily="2" charset="0"/>
+                <a:latin typeface="PT Sans" panose="020B0503020203020204" pitchFamily="34" charset="-52"/>
               </a:rPr>
               <a:t>în</a:t>
             </a:r>
@@ -16612,17 +16890,17 @@
                   <a:srgbClr val="242438"/>
                 </a:solidFill>
                 <a:effectLst/>
-                <a:latin typeface="Roboto" panose="02000000000000000000" pitchFamily="2" charset="0"/>
-              </a:rPr>
-              <a:t> </a:t>
-            </a:r>
-            <a:r>
-              <a:rPr lang="en-US" sz="1800" b="0" i="0" dirty="0" err="1">
-                <a:solidFill>
-                  <a:srgbClr val="242438"/>
-                </a:solidFill>
-                <a:effectLst/>
-                <a:latin typeface="Roboto" panose="02000000000000000000" pitchFamily="2" charset="0"/>
+                <a:latin typeface="PT Sans" panose="020B0503020203020204" pitchFamily="34" charset="-52"/>
+              </a:rPr>
+              <a:t> </a:t>
+            </a:r>
+            <a:r>
+              <a:rPr lang="en-US" sz="1800" b="0" i="0" dirty="0" err="1">
+                <a:solidFill>
+                  <a:srgbClr val="242438"/>
+                </a:solidFill>
+                <a:effectLst/>
+                <a:latin typeface="PT Sans" panose="020B0503020203020204" pitchFamily="34" charset="-52"/>
               </a:rPr>
               <a:t>cadrul</a:t>
             </a:r>
@@ -16632,17 +16910,17 @@
                   <a:srgbClr val="242438"/>
                 </a:solidFill>
                 <a:effectLst/>
-                <a:latin typeface="Roboto" panose="02000000000000000000" pitchFamily="2" charset="0"/>
-              </a:rPr>
-              <a:t> </a:t>
-            </a:r>
-            <a:r>
-              <a:rPr lang="en-US" sz="1800" b="0" i="0" dirty="0" err="1">
-                <a:solidFill>
-                  <a:srgbClr val="242438"/>
-                </a:solidFill>
-                <a:effectLst/>
-                <a:latin typeface="Roboto" panose="02000000000000000000" pitchFamily="2" charset="0"/>
+                <a:latin typeface="PT Sans" panose="020B0503020203020204" pitchFamily="34" charset="-52"/>
+              </a:rPr>
+              <a:t> </a:t>
+            </a:r>
+            <a:r>
+              <a:rPr lang="en-US" sz="1800" b="0" i="0" dirty="0" err="1">
+                <a:solidFill>
+                  <a:srgbClr val="242438"/>
+                </a:solidFill>
+                <a:effectLst/>
+                <a:latin typeface="PT Sans" panose="020B0503020203020204" pitchFamily="34" charset="-52"/>
               </a:rPr>
               <a:t>aplicațiilor</a:t>
             </a:r>
@@ -16652,7 +16930,7 @@
                   <a:srgbClr val="242438"/>
                 </a:solidFill>
                 <a:effectLst/>
-                <a:latin typeface="Roboto" panose="02000000000000000000" pitchFamily="2" charset="0"/>
+                <a:latin typeface="PT Sans" panose="020B0503020203020204" pitchFamily="34" charset="-52"/>
               </a:rPr>
               <a:t> web. Site-urile web care permit </a:t>
             </a:r>
@@ -16662,7 +16940,7 @@
                   <a:srgbClr val="242438"/>
                 </a:solidFill>
                 <a:effectLst/>
-                <a:latin typeface="Roboto" panose="02000000000000000000" pitchFamily="2" charset="0"/>
+                <a:latin typeface="PT Sans" panose="020B0503020203020204" pitchFamily="34" charset="-52"/>
               </a:rPr>
               <a:t>utilizatorului</a:t>
             </a:r>
@@ -16672,17 +16950,17 @@
                   <a:srgbClr val="242438"/>
                 </a:solidFill>
                 <a:effectLst/>
-                <a:latin typeface="Roboto" panose="02000000000000000000" pitchFamily="2" charset="0"/>
-              </a:rPr>
-              <a:t> </a:t>
-            </a:r>
-            <a:r>
-              <a:rPr lang="en-US" sz="1800" b="0" i="0" dirty="0" err="1">
-                <a:solidFill>
-                  <a:srgbClr val="242438"/>
-                </a:solidFill>
-                <a:effectLst/>
-                <a:latin typeface="Roboto" panose="02000000000000000000" pitchFamily="2" charset="0"/>
+                <a:latin typeface="PT Sans" panose="020B0503020203020204" pitchFamily="34" charset="-52"/>
+              </a:rPr>
+              <a:t> </a:t>
+            </a:r>
+            <a:r>
+              <a:rPr lang="en-US" sz="1800" b="0" i="0" dirty="0" err="1">
+                <a:solidFill>
+                  <a:srgbClr val="242438"/>
+                </a:solidFill>
+                <a:effectLst/>
+                <a:latin typeface="PT Sans" panose="020B0503020203020204" pitchFamily="34" charset="-52"/>
               </a:rPr>
               <a:t>să</a:t>
             </a:r>
@@ -16692,17 +16970,17 @@
                   <a:srgbClr val="242438"/>
                 </a:solidFill>
                 <a:effectLst/>
-                <a:latin typeface="Roboto" panose="02000000000000000000" pitchFamily="2" charset="0"/>
-              </a:rPr>
-              <a:t> </a:t>
-            </a:r>
-            <a:r>
-              <a:rPr lang="en-US" sz="1800" b="0" i="0" dirty="0" err="1">
-                <a:solidFill>
-                  <a:srgbClr val="242438"/>
-                </a:solidFill>
-                <a:effectLst/>
-                <a:latin typeface="Roboto" panose="02000000000000000000" pitchFamily="2" charset="0"/>
+                <a:latin typeface="PT Sans" panose="020B0503020203020204" pitchFamily="34" charset="-52"/>
+              </a:rPr>
+              <a:t> </a:t>
+            </a:r>
+            <a:r>
+              <a:rPr lang="en-US" sz="1800" b="0" i="0" dirty="0" err="1">
+                <a:solidFill>
+                  <a:srgbClr val="242438"/>
+                </a:solidFill>
+                <a:effectLst/>
+                <a:latin typeface="PT Sans" panose="020B0503020203020204" pitchFamily="34" charset="-52"/>
               </a:rPr>
               <a:t>modifice</a:t>
             </a:r>
@@ -16712,7 +16990,7 @@
                   <a:srgbClr val="242438"/>
                 </a:solidFill>
                 <a:effectLst/>
-                <a:latin typeface="Roboto" panose="02000000000000000000" pitchFamily="2" charset="0"/>
+                <a:latin typeface="PT Sans" panose="020B0503020203020204" pitchFamily="34" charset="-52"/>
               </a:rPr>
               <a:t> iframe </a:t>
             </a:r>
@@ -16722,7 +17000,7 @@
                   <a:srgbClr val="242438"/>
                 </a:solidFill>
                 <a:effectLst/>
-                <a:latin typeface="Roboto" panose="02000000000000000000" pitchFamily="2" charset="0"/>
+                <a:latin typeface="PT Sans" panose="020B0503020203020204" pitchFamily="34" charset="-52"/>
               </a:rPr>
               <a:t>sau</a:t>
             </a:r>
@@ -16732,17 +17010,17 @@
                   <a:srgbClr val="242438"/>
                 </a:solidFill>
                 <a:effectLst/>
-                <a:latin typeface="Roboto" panose="02000000000000000000" pitchFamily="2" charset="0"/>
-              </a:rPr>
-              <a:t> </a:t>
-            </a:r>
-            <a:r>
-              <a:rPr lang="en-US" sz="1800" b="0" i="0" dirty="0" err="1">
-                <a:solidFill>
-                  <a:srgbClr val="242438"/>
-                </a:solidFill>
-                <a:effectLst/>
-                <a:latin typeface="Roboto" panose="02000000000000000000" pitchFamily="2" charset="0"/>
+                <a:latin typeface="PT Sans" panose="020B0503020203020204" pitchFamily="34" charset="-52"/>
+              </a:rPr>
+              <a:t> </a:t>
+            </a:r>
+            <a:r>
+              <a:rPr lang="en-US" sz="1800" b="0" i="0" dirty="0" err="1">
+                <a:solidFill>
+                  <a:srgbClr val="242438"/>
+                </a:solidFill>
+                <a:effectLst/>
+                <a:latin typeface="PT Sans" panose="020B0503020203020204" pitchFamily="34" charset="-52"/>
               </a:rPr>
               <a:t>alte</a:t>
             </a:r>
@@ -16752,17 +17030,17 @@
                   <a:srgbClr val="242438"/>
                 </a:solidFill>
                 <a:effectLst/>
-                <a:latin typeface="Roboto" panose="02000000000000000000" pitchFamily="2" charset="0"/>
-              </a:rPr>
-              <a:t> </a:t>
-            </a:r>
-            <a:r>
-              <a:rPr lang="en-US" sz="1800" b="0" i="0" dirty="0" err="1">
-                <a:solidFill>
-                  <a:srgbClr val="242438"/>
-                </a:solidFill>
-                <a:effectLst/>
-                <a:latin typeface="Roboto" panose="02000000000000000000" pitchFamily="2" charset="0"/>
+                <a:latin typeface="PT Sans" panose="020B0503020203020204" pitchFamily="34" charset="-52"/>
+              </a:rPr>
+              <a:t> </a:t>
+            </a:r>
+            <a:r>
+              <a:rPr lang="en-US" sz="1800" b="0" i="0" dirty="0" err="1">
+                <a:solidFill>
+                  <a:srgbClr val="242438"/>
+                </a:solidFill>
+                <a:effectLst/>
+                <a:latin typeface="PT Sans" panose="020B0503020203020204" pitchFamily="34" charset="-52"/>
               </a:rPr>
               <a:t>elemente</a:t>
             </a:r>
@@ -16772,7 +17050,7 @@
                   <a:srgbClr val="242438"/>
                 </a:solidFill>
                 <a:effectLst/>
-                <a:latin typeface="Roboto" panose="02000000000000000000" pitchFamily="2" charset="0"/>
+                <a:latin typeface="PT Sans" panose="020B0503020203020204" pitchFamily="34" charset="-52"/>
               </a:rPr>
               <a:t> DOM </a:t>
             </a:r>
@@ -16782,7 +17060,7 @@
                   <a:srgbClr val="242438"/>
                 </a:solidFill>
                 <a:effectLst/>
-                <a:latin typeface="Roboto" panose="02000000000000000000" pitchFamily="2" charset="0"/>
+                <a:latin typeface="PT Sans" panose="020B0503020203020204" pitchFamily="34" charset="-52"/>
               </a:rPr>
               <a:t>vor</a:t>
             </a:r>
@@ -16792,7 +17070,7 @@
                   <a:srgbClr val="242438"/>
                 </a:solidFill>
                 <a:effectLst/>
-                <a:latin typeface="Roboto" panose="02000000000000000000" pitchFamily="2" charset="0"/>
+                <a:latin typeface="PT Sans" panose="020B0503020203020204" pitchFamily="34" charset="-52"/>
               </a:rPr>
               <a:t> fi </a:t>
             </a:r>
@@ -16802,7 +17080,7 @@
                   <a:srgbClr val="242438"/>
                 </a:solidFill>
                 <a:effectLst/>
-                <a:latin typeface="Roboto" panose="02000000000000000000" pitchFamily="2" charset="0"/>
+                <a:latin typeface="PT Sans" panose="020B0503020203020204" pitchFamily="34" charset="-52"/>
               </a:rPr>
               <a:t>cel</a:t>
             </a:r>
@@ -16812,17 +17090,17 @@
                   <a:srgbClr val="242438"/>
                 </a:solidFill>
                 <a:effectLst/>
-                <a:latin typeface="Roboto" panose="02000000000000000000" pitchFamily="2" charset="0"/>
-              </a:rPr>
-              <a:t> </a:t>
-            </a:r>
-            <a:r>
-              <a:rPr lang="en-US" sz="1800" b="0" i="0" dirty="0" err="1">
-                <a:solidFill>
-                  <a:srgbClr val="242438"/>
-                </a:solidFill>
-                <a:effectLst/>
-                <a:latin typeface="Roboto" panose="02000000000000000000" pitchFamily="2" charset="0"/>
+                <a:latin typeface="PT Sans" panose="020B0503020203020204" pitchFamily="34" charset="-52"/>
+              </a:rPr>
+              <a:t> </a:t>
+            </a:r>
+            <a:r>
+              <a:rPr lang="en-US" sz="1800" b="0" i="0" dirty="0" err="1">
+                <a:solidFill>
+                  <a:srgbClr val="242438"/>
+                </a:solidFill>
+                <a:effectLst/>
+                <a:latin typeface="PT Sans" panose="020B0503020203020204" pitchFamily="34" charset="-52"/>
               </a:rPr>
               <a:t>mai</a:t>
             </a:r>
@@ -16832,17 +17110,17 @@
                   <a:srgbClr val="242438"/>
                 </a:solidFill>
                 <a:effectLst/>
-                <a:latin typeface="Roboto" panose="02000000000000000000" pitchFamily="2" charset="0"/>
-              </a:rPr>
-              <a:t> </a:t>
-            </a:r>
-            <a:r>
-              <a:rPr lang="en-US" sz="1800" b="0" i="0" dirty="0" err="1">
-                <a:solidFill>
-                  <a:srgbClr val="242438"/>
-                </a:solidFill>
-                <a:effectLst/>
-                <a:latin typeface="Roboto" panose="02000000000000000000" pitchFamily="2" charset="0"/>
+                <a:latin typeface="PT Sans" panose="020B0503020203020204" pitchFamily="34" charset="-52"/>
+              </a:rPr>
+              <a:t> </a:t>
+            </a:r>
+            <a:r>
+              <a:rPr lang="en-US" sz="1800" b="0" i="0" dirty="0" err="1">
+                <a:solidFill>
+                  <a:srgbClr val="242438"/>
+                </a:solidFill>
+                <a:effectLst/>
+                <a:latin typeface="PT Sans" panose="020B0503020203020204" pitchFamily="34" charset="-52"/>
               </a:rPr>
               <a:t>probabil</a:t>
             </a:r>
@@ -16852,17 +17130,17 @@
                   <a:srgbClr val="242438"/>
                 </a:solidFill>
                 <a:effectLst/>
-                <a:latin typeface="Roboto" panose="02000000000000000000" pitchFamily="2" charset="0"/>
-              </a:rPr>
-              <a:t> </a:t>
-            </a:r>
-            <a:r>
-              <a:rPr lang="en-US" sz="1800" b="0" i="0" dirty="0" err="1">
-                <a:solidFill>
-                  <a:srgbClr val="242438"/>
-                </a:solidFill>
-                <a:effectLst/>
-                <a:latin typeface="Roboto" panose="02000000000000000000" pitchFamily="2" charset="0"/>
+                <a:latin typeface="PT Sans" panose="020B0503020203020204" pitchFamily="34" charset="-52"/>
+              </a:rPr>
+              <a:t> </a:t>
+            </a:r>
+            <a:r>
+              <a:rPr lang="en-US" sz="1800" b="0" i="0" dirty="0" err="1">
+                <a:solidFill>
+                  <a:srgbClr val="242438"/>
+                </a:solidFill>
+                <a:effectLst/>
+                <a:latin typeface="PT Sans" panose="020B0503020203020204" pitchFamily="34" charset="-52"/>
               </a:rPr>
               <a:t>vulnerabile</a:t>
             </a:r>
@@ -16872,11 +17150,13 @@
                   <a:srgbClr val="242438"/>
                 </a:solidFill>
                 <a:effectLst/>
-                <a:latin typeface="Roboto" panose="02000000000000000000" pitchFamily="2" charset="0"/>
+                <a:latin typeface="PT Sans" panose="020B0503020203020204" pitchFamily="34" charset="-52"/>
               </a:rPr>
               <a:t> la XSS.</a:t>
             </a:r>
-            <a:endParaRPr lang="ru-RU" dirty="0"/>
+            <a:endParaRPr lang="ru-RU" dirty="0">
+              <a:latin typeface="PT Sans" panose="020B0503020203020204" pitchFamily="34" charset="-52"/>
+            </a:endParaRPr>
           </a:p>
         </p:txBody>
       </p:sp>
@@ -17107,676 +17387,678 @@
               <a:buNone/>
             </a:pPr>
             <a:r>
-              <a:rPr lang="en-US" b="0" i="0" dirty="0">
-                <a:solidFill>
-                  <a:srgbClr val="242438"/>
-                </a:solidFill>
-                <a:effectLst/>
-                <a:latin typeface="Roboto" panose="02000000000000000000" pitchFamily="2" charset="0"/>
+              <a:rPr lang="en-US" sz="1800" b="0" i="0" dirty="0">
+                <a:solidFill>
+                  <a:srgbClr val="242438"/>
+                </a:solidFill>
+                <a:effectLst/>
+                <a:latin typeface="PT Sans" panose="020B0503020203020204" pitchFamily="34" charset="-52"/>
               </a:rPr>
               <a:t>De </a:t>
             </a:r>
             <a:r>
-              <a:rPr lang="en-US" b="0" i="0" dirty="0" err="1">
-                <a:solidFill>
-                  <a:srgbClr val="242438"/>
-                </a:solidFill>
-                <a:effectLst/>
-                <a:latin typeface="Roboto" panose="02000000000000000000" pitchFamily="2" charset="0"/>
+              <a:rPr lang="en-US" sz="1800" b="0" i="0" dirty="0" err="1">
+                <a:solidFill>
+                  <a:srgbClr val="242438"/>
+                </a:solidFill>
+                <a:effectLst/>
+                <a:latin typeface="PT Sans" panose="020B0503020203020204" pitchFamily="34" charset="-52"/>
               </a:rPr>
               <a:t>ce</a:t>
             </a:r>
             <a:r>
-              <a:rPr lang="en-US" b="0" i="0" dirty="0">
-                <a:solidFill>
-                  <a:srgbClr val="242438"/>
-                </a:solidFill>
-                <a:effectLst/>
-                <a:latin typeface="Roboto" panose="02000000000000000000" pitchFamily="2" charset="0"/>
-              </a:rPr>
-              <a:t> </a:t>
-            </a:r>
-            <a:r>
-              <a:rPr lang="en-US" b="0" i="0" dirty="0" err="1">
-                <a:solidFill>
-                  <a:srgbClr val="242438"/>
-                </a:solidFill>
-                <a:effectLst/>
-                <a:latin typeface="Roboto" panose="02000000000000000000" pitchFamily="2" charset="0"/>
+              <a:rPr lang="en-US" sz="1800" b="0" i="0" dirty="0">
+                <a:solidFill>
+                  <a:srgbClr val="242438"/>
+                </a:solidFill>
+                <a:effectLst/>
+                <a:latin typeface="PT Sans" panose="020B0503020203020204" pitchFamily="34" charset="-52"/>
+              </a:rPr>
+              <a:t> </a:t>
+            </a:r>
+            <a:r>
+              <a:rPr lang="en-US" sz="1800" b="0" i="0" dirty="0" err="1">
+                <a:solidFill>
+                  <a:srgbClr val="242438"/>
+                </a:solidFill>
+                <a:effectLst/>
+                <a:latin typeface="PT Sans" panose="020B0503020203020204" pitchFamily="34" charset="-52"/>
               </a:rPr>
               <a:t>funcționează</a:t>
             </a:r>
             <a:r>
-              <a:rPr lang="en-US" b="0" i="0" dirty="0">
-                <a:solidFill>
-                  <a:srgbClr val="242438"/>
-                </a:solidFill>
-                <a:effectLst/>
-                <a:latin typeface="Roboto" panose="02000000000000000000" pitchFamily="2" charset="0"/>
-              </a:rPr>
-              <a:t> </a:t>
-            </a:r>
-            <a:r>
-              <a:rPr lang="en-US" b="0" i="0" dirty="0" err="1">
-                <a:solidFill>
-                  <a:srgbClr val="242438"/>
-                </a:solidFill>
-                <a:effectLst/>
-                <a:latin typeface="Roboto" panose="02000000000000000000" pitchFamily="2" charset="0"/>
+              <a:rPr lang="en-US" sz="1800" b="0" i="0" dirty="0">
+                <a:solidFill>
+                  <a:srgbClr val="242438"/>
+                </a:solidFill>
+                <a:effectLst/>
+                <a:latin typeface="PT Sans" panose="020B0503020203020204" pitchFamily="34" charset="-52"/>
+              </a:rPr>
+              <a:t> </a:t>
+            </a:r>
+            <a:r>
+              <a:rPr lang="en-US" sz="1800" b="0" i="0" dirty="0" err="1">
+                <a:solidFill>
+                  <a:srgbClr val="242438"/>
+                </a:solidFill>
+                <a:effectLst/>
+                <a:latin typeface="PT Sans" panose="020B0503020203020204" pitchFamily="34" charset="-52"/>
               </a:rPr>
               <a:t>acest</a:t>
             </a:r>
             <a:r>
-              <a:rPr lang="en-US" b="0" i="0" dirty="0">
-                <a:solidFill>
-                  <a:srgbClr val="242438"/>
-                </a:solidFill>
-                <a:effectLst/>
-                <a:latin typeface="Roboto" panose="02000000000000000000" pitchFamily="2" charset="0"/>
-              </a:rPr>
-              <a:t> </a:t>
-            </a:r>
-            <a:r>
-              <a:rPr lang="en-US" b="0" i="0" dirty="0" err="1">
-                <a:solidFill>
-                  <a:srgbClr val="242438"/>
-                </a:solidFill>
-                <a:effectLst/>
-                <a:latin typeface="Roboto" panose="02000000000000000000" pitchFamily="2" charset="0"/>
+              <a:rPr lang="en-US" sz="1800" b="0" i="0" dirty="0">
+                <a:solidFill>
+                  <a:srgbClr val="242438"/>
+                </a:solidFill>
+                <a:effectLst/>
+                <a:latin typeface="PT Sans" panose="020B0503020203020204" pitchFamily="34" charset="-52"/>
+              </a:rPr>
+              <a:t> </a:t>
+            </a:r>
+            <a:r>
+              <a:rPr lang="en-US" sz="1800" b="0" i="0" dirty="0" err="1">
+                <a:solidFill>
+                  <a:srgbClr val="242438"/>
+                </a:solidFill>
+                <a:effectLst/>
+                <a:latin typeface="PT Sans" panose="020B0503020203020204" pitchFamily="34" charset="-52"/>
               </a:rPr>
               <a:t>lucru</a:t>
             </a:r>
             <a:r>
-              <a:rPr lang="en-US" b="0" i="0" dirty="0">
-                <a:solidFill>
-                  <a:srgbClr val="242438"/>
-                </a:solidFill>
-                <a:effectLst/>
-                <a:latin typeface="Roboto" panose="02000000000000000000" pitchFamily="2" charset="0"/>
+              <a:rPr lang="en-US" sz="1800" b="0" i="0" dirty="0">
+                <a:solidFill>
+                  <a:srgbClr val="242438"/>
+                </a:solidFill>
+                <a:effectLst/>
+                <a:latin typeface="PT Sans" panose="020B0503020203020204" pitchFamily="34" charset="-52"/>
               </a:rPr>
               <a:t>? Este o </a:t>
             </a:r>
             <a:r>
-              <a:rPr lang="en-US" b="0" i="0" dirty="0" err="1">
-                <a:solidFill>
-                  <a:srgbClr val="242438"/>
-                </a:solidFill>
-                <a:effectLst/>
-                <a:latin typeface="Roboto" panose="02000000000000000000" pitchFamily="2" charset="0"/>
+              <a:rPr lang="en-US" sz="1800" b="0" i="0" dirty="0" err="1">
+                <a:solidFill>
+                  <a:srgbClr val="242438"/>
+                </a:solidFill>
+                <a:effectLst/>
+                <a:latin typeface="PT Sans" panose="020B0503020203020204" pitchFamily="34" charset="-52"/>
               </a:rPr>
               <a:t>practică</a:t>
             </a:r>
             <a:r>
-              <a:rPr lang="en-US" b="0" i="0" dirty="0">
-                <a:solidFill>
-                  <a:srgbClr val="242438"/>
-                </a:solidFill>
-                <a:effectLst/>
-                <a:latin typeface="Roboto" panose="02000000000000000000" pitchFamily="2" charset="0"/>
-              </a:rPr>
-              <a:t> </a:t>
-            </a:r>
-            <a:r>
-              <a:rPr lang="en-US" b="0" i="0" dirty="0" err="1">
-                <a:solidFill>
-                  <a:srgbClr val="242438"/>
-                </a:solidFill>
-                <a:effectLst/>
-                <a:latin typeface="Roboto" panose="02000000000000000000" pitchFamily="2" charset="0"/>
+              <a:rPr lang="en-US" sz="1800" b="0" i="0" dirty="0">
+                <a:solidFill>
+                  <a:srgbClr val="242438"/>
+                </a:solidFill>
+                <a:effectLst/>
+                <a:latin typeface="PT Sans" panose="020B0503020203020204" pitchFamily="34" charset="-52"/>
+              </a:rPr>
+              <a:t> </a:t>
+            </a:r>
+            <a:r>
+              <a:rPr lang="en-US" sz="1800" b="0" i="0" dirty="0" err="1">
+                <a:solidFill>
+                  <a:srgbClr val="242438"/>
+                </a:solidFill>
+                <a:effectLst/>
+                <a:latin typeface="PT Sans" panose="020B0503020203020204" pitchFamily="34" charset="-52"/>
               </a:rPr>
               <a:t>obișnuită</a:t>
             </a:r>
             <a:r>
-              <a:rPr lang="en-US" b="0" i="0" dirty="0">
-                <a:solidFill>
-                  <a:srgbClr val="242438"/>
-                </a:solidFill>
-                <a:effectLst/>
-                <a:latin typeface="Roboto" panose="02000000000000000000" pitchFamily="2" charset="0"/>
+              <a:rPr lang="en-US" sz="1800" b="0" i="0" dirty="0">
+                <a:solidFill>
+                  <a:srgbClr val="242438"/>
+                </a:solidFill>
+                <a:effectLst/>
+                <a:latin typeface="PT Sans" panose="020B0503020203020204" pitchFamily="34" charset="-52"/>
               </a:rPr>
               <a:t> ca bara de </a:t>
             </a:r>
             <a:r>
-              <a:rPr lang="en-US" b="0" i="0" dirty="0" err="1">
-                <a:solidFill>
-                  <a:srgbClr val="242438"/>
-                </a:solidFill>
-                <a:effectLst/>
-                <a:latin typeface="Roboto" panose="02000000000000000000" pitchFamily="2" charset="0"/>
+              <a:rPr lang="en-US" sz="1800" b="0" i="0" dirty="0" err="1">
+                <a:solidFill>
+                  <a:srgbClr val="242438"/>
+                </a:solidFill>
+                <a:effectLst/>
+                <a:latin typeface="PT Sans" panose="020B0503020203020204" pitchFamily="34" charset="-52"/>
               </a:rPr>
               <a:t>căutare</a:t>
             </a:r>
             <a:r>
-              <a:rPr lang="en-US" b="0" i="0" dirty="0">
-                <a:solidFill>
-                  <a:srgbClr val="242438"/>
-                </a:solidFill>
-                <a:effectLst/>
-                <a:latin typeface="Roboto" panose="02000000000000000000" pitchFamily="2" charset="0"/>
-              </a:rPr>
-              <a:t> </a:t>
-            </a:r>
-            <a:r>
-              <a:rPr lang="en-US" b="0" i="0" dirty="0" err="1">
-                <a:solidFill>
-                  <a:srgbClr val="242438"/>
-                </a:solidFill>
-                <a:effectLst/>
-                <a:latin typeface="Roboto" panose="02000000000000000000" pitchFamily="2" charset="0"/>
+              <a:rPr lang="en-US" sz="1800" b="0" i="0" dirty="0">
+                <a:solidFill>
+                  <a:srgbClr val="242438"/>
+                </a:solidFill>
+                <a:effectLst/>
+                <a:latin typeface="PT Sans" panose="020B0503020203020204" pitchFamily="34" charset="-52"/>
+              </a:rPr>
+              <a:t> </a:t>
+            </a:r>
+            <a:r>
+              <a:rPr lang="en-US" sz="1800" b="0" i="0" dirty="0" err="1">
+                <a:solidFill>
+                  <a:srgbClr val="242438"/>
+                </a:solidFill>
+                <a:effectLst/>
+                <a:latin typeface="PT Sans" panose="020B0503020203020204" pitchFamily="34" charset="-52"/>
               </a:rPr>
               <a:t>să</a:t>
             </a:r>
             <a:r>
-              <a:rPr lang="en-US" b="0" i="0" dirty="0">
-                <a:solidFill>
-                  <a:srgbClr val="242438"/>
-                </a:solidFill>
-                <a:effectLst/>
-                <a:latin typeface="Roboto" panose="02000000000000000000" pitchFamily="2" charset="0"/>
-              </a:rPr>
-              <a:t> </a:t>
-            </a:r>
-            <a:r>
-              <a:rPr lang="en-US" b="0" i="0" dirty="0" err="1">
-                <a:solidFill>
-                  <a:srgbClr val="242438"/>
-                </a:solidFill>
-                <a:effectLst/>
-                <a:latin typeface="Roboto" panose="02000000000000000000" pitchFamily="2" charset="0"/>
+              <a:rPr lang="en-US" sz="1800" b="0" i="0" dirty="0">
+                <a:solidFill>
+                  <a:srgbClr val="242438"/>
+                </a:solidFill>
+                <a:effectLst/>
+                <a:latin typeface="PT Sans" panose="020B0503020203020204" pitchFamily="34" charset="-52"/>
+              </a:rPr>
+              <a:t> </a:t>
+            </a:r>
+            <a:r>
+              <a:rPr lang="en-US" sz="1800" b="0" i="0" dirty="0" err="1">
+                <a:solidFill>
+                  <a:srgbClr val="242438"/>
+                </a:solidFill>
+                <a:effectLst/>
+                <a:latin typeface="PT Sans" panose="020B0503020203020204" pitchFamily="34" charset="-52"/>
               </a:rPr>
               <a:t>trimită</a:t>
             </a:r>
             <a:r>
-              <a:rPr lang="en-US" b="0" i="0" dirty="0">
-                <a:solidFill>
-                  <a:srgbClr val="242438"/>
-                </a:solidFill>
-                <a:effectLst/>
-                <a:latin typeface="Roboto" panose="02000000000000000000" pitchFamily="2" charset="0"/>
+              <a:rPr lang="en-US" sz="1800" b="0" i="0" dirty="0">
+                <a:solidFill>
+                  <a:srgbClr val="242438"/>
+                </a:solidFill>
+                <a:effectLst/>
+                <a:latin typeface="PT Sans" panose="020B0503020203020204" pitchFamily="34" charset="-52"/>
               </a:rPr>
               <a:t> o </a:t>
             </a:r>
             <a:r>
-              <a:rPr lang="en-US" b="0" i="0" dirty="0" err="1">
-                <a:solidFill>
-                  <a:srgbClr val="242438"/>
-                </a:solidFill>
-                <a:effectLst/>
-                <a:latin typeface="Roboto" panose="02000000000000000000" pitchFamily="2" charset="0"/>
+              <a:rPr lang="en-US" sz="1800" b="0" i="0" dirty="0" err="1">
+                <a:solidFill>
+                  <a:srgbClr val="242438"/>
+                </a:solidFill>
+                <a:effectLst/>
+                <a:latin typeface="PT Sans" panose="020B0503020203020204" pitchFamily="34" charset="-52"/>
               </a:rPr>
               <a:t>cerere</a:t>
             </a:r>
             <a:r>
-              <a:rPr lang="en-US" b="0" i="0" dirty="0">
-                <a:solidFill>
-                  <a:srgbClr val="242438"/>
-                </a:solidFill>
-                <a:effectLst/>
-                <a:latin typeface="Roboto" panose="02000000000000000000" pitchFamily="2" charset="0"/>
-              </a:rPr>
-              <a:t> </a:t>
-            </a:r>
-            <a:r>
-              <a:rPr lang="en-US" b="0" i="0" dirty="0" err="1">
-                <a:solidFill>
-                  <a:srgbClr val="242438"/>
-                </a:solidFill>
-                <a:effectLst/>
-                <a:latin typeface="Roboto" panose="02000000000000000000" pitchFamily="2" charset="0"/>
+              <a:rPr lang="en-US" sz="1800" b="0" i="0" dirty="0">
+                <a:solidFill>
+                  <a:srgbClr val="242438"/>
+                </a:solidFill>
+                <a:effectLst/>
+                <a:latin typeface="PT Sans" panose="020B0503020203020204" pitchFamily="34" charset="-52"/>
+              </a:rPr>
+              <a:t> </a:t>
+            </a:r>
+            <a:r>
+              <a:rPr lang="en-US" sz="1800" b="0" i="0" dirty="0" err="1">
+                <a:solidFill>
+                  <a:srgbClr val="242438"/>
+                </a:solidFill>
+                <a:effectLst/>
+                <a:latin typeface="PT Sans" panose="020B0503020203020204" pitchFamily="34" charset="-52"/>
               </a:rPr>
               <a:t>serverului</a:t>
             </a:r>
             <a:r>
-              <a:rPr lang="en-US" b="0" i="0" dirty="0">
-                <a:solidFill>
-                  <a:srgbClr val="242438"/>
-                </a:solidFill>
-                <a:effectLst/>
-                <a:latin typeface="Roboto" panose="02000000000000000000" pitchFamily="2" charset="0"/>
-              </a:rPr>
-              <a:t> </a:t>
-            </a:r>
-            <a:r>
-              <a:rPr lang="en-US" b="0" i="0" dirty="0" err="1">
-                <a:solidFill>
-                  <a:srgbClr val="242438"/>
-                </a:solidFill>
-                <a:effectLst/>
-                <a:latin typeface="Roboto" panose="02000000000000000000" pitchFamily="2" charset="0"/>
+              <a:rPr lang="en-US" sz="1800" b="0" i="0" dirty="0">
+                <a:solidFill>
+                  <a:srgbClr val="242438"/>
+                </a:solidFill>
+                <a:effectLst/>
+                <a:latin typeface="PT Sans" panose="020B0503020203020204" pitchFamily="34" charset="-52"/>
+              </a:rPr>
+              <a:t> </a:t>
+            </a:r>
+            <a:r>
+              <a:rPr lang="en-US" sz="1800" b="0" i="0" dirty="0" err="1">
+                <a:solidFill>
+                  <a:srgbClr val="242438"/>
+                </a:solidFill>
+                <a:effectLst/>
+                <a:latin typeface="PT Sans" panose="020B0503020203020204" pitchFamily="34" charset="-52"/>
               </a:rPr>
               <a:t>în</a:t>
             </a:r>
             <a:r>
-              <a:rPr lang="en-US" b="0" i="0" dirty="0">
-                <a:solidFill>
-                  <a:srgbClr val="242438"/>
-                </a:solidFill>
-                <a:effectLst/>
-                <a:latin typeface="Roboto" panose="02000000000000000000" pitchFamily="2" charset="0"/>
+              <a:rPr lang="en-US" sz="1800" b="0" i="0" dirty="0">
+                <a:solidFill>
+                  <a:srgbClr val="242438"/>
+                </a:solidFill>
+                <a:effectLst/>
+                <a:latin typeface="PT Sans" panose="020B0503020203020204" pitchFamily="34" charset="-52"/>
               </a:rPr>
               <a:t> care </a:t>
             </a:r>
             <a:r>
-              <a:rPr lang="en-US" b="0" i="0" dirty="0" err="1">
-                <a:solidFill>
-                  <a:srgbClr val="242438"/>
-                </a:solidFill>
-                <a:effectLst/>
-                <a:latin typeface="Roboto" panose="02000000000000000000" pitchFamily="2" charset="0"/>
+              <a:rPr lang="en-US" sz="1800" b="0" i="0" dirty="0" err="1">
+                <a:solidFill>
+                  <a:srgbClr val="242438"/>
+                </a:solidFill>
+                <a:effectLst/>
+                <a:latin typeface="PT Sans" panose="020B0503020203020204" pitchFamily="34" charset="-52"/>
               </a:rPr>
               <a:t>va</a:t>
             </a:r>
             <a:r>
-              <a:rPr lang="en-US" b="0" i="0" dirty="0">
-                <a:solidFill>
-                  <a:srgbClr val="242438"/>
-                </a:solidFill>
-                <a:effectLst/>
-                <a:latin typeface="Roboto" panose="02000000000000000000" pitchFamily="2" charset="0"/>
-              </a:rPr>
-              <a:t> </a:t>
-            </a:r>
-            <a:r>
-              <a:rPr lang="en-US" b="0" i="0" dirty="0" err="1">
-                <a:solidFill>
-                  <a:srgbClr val="242438"/>
-                </a:solidFill>
-                <a:effectLst/>
-                <a:latin typeface="Roboto" panose="02000000000000000000" pitchFamily="2" charset="0"/>
+              <a:rPr lang="en-US" sz="1800" b="0" i="0" dirty="0">
+                <a:solidFill>
+                  <a:srgbClr val="242438"/>
+                </a:solidFill>
+                <a:effectLst/>
+                <a:latin typeface="PT Sans" panose="020B0503020203020204" pitchFamily="34" charset="-52"/>
+              </a:rPr>
+              <a:t> </a:t>
+            </a:r>
+            <a:r>
+              <a:rPr lang="en-US" sz="1800" b="0" i="0" dirty="0" err="1">
+                <a:solidFill>
+                  <a:srgbClr val="242438"/>
+                </a:solidFill>
+                <a:effectLst/>
+                <a:latin typeface="PT Sans" panose="020B0503020203020204" pitchFamily="34" charset="-52"/>
               </a:rPr>
               <a:t>trimite</a:t>
             </a:r>
             <a:r>
-              <a:rPr lang="en-US" b="0" i="0" dirty="0">
-                <a:solidFill>
-                  <a:srgbClr val="242438"/>
-                </a:solidFill>
-                <a:effectLst/>
-                <a:latin typeface="Roboto" panose="02000000000000000000" pitchFamily="2" charset="0"/>
-              </a:rPr>
-              <a:t> </a:t>
-            </a:r>
-            <a:r>
-              <a:rPr lang="en-US" b="0" i="0" dirty="0" err="1">
-                <a:solidFill>
-                  <a:srgbClr val="242438"/>
-                </a:solidFill>
-                <a:effectLst/>
-                <a:latin typeface="Roboto" panose="02000000000000000000" pitchFamily="2" charset="0"/>
+              <a:rPr lang="en-US" sz="1800" b="0" i="0" dirty="0">
+                <a:solidFill>
+                  <a:srgbClr val="242438"/>
+                </a:solidFill>
+                <a:effectLst/>
+                <a:latin typeface="PT Sans" panose="020B0503020203020204" pitchFamily="34" charset="-52"/>
+              </a:rPr>
+              <a:t> </a:t>
+            </a:r>
+            <a:r>
+              <a:rPr lang="en-US" sz="1800" b="0" i="0" dirty="0" err="1">
+                <a:solidFill>
+                  <a:srgbClr val="242438"/>
+                </a:solidFill>
+                <a:effectLst/>
+                <a:latin typeface="PT Sans" panose="020B0503020203020204" pitchFamily="34" charset="-52"/>
               </a:rPr>
               <a:t>apoi</a:t>
             </a:r>
             <a:r>
-              <a:rPr lang="en-US" b="0" i="0" dirty="0">
-                <a:solidFill>
-                  <a:srgbClr val="242438"/>
-                </a:solidFill>
-                <a:effectLst/>
-                <a:latin typeface="Roboto" panose="02000000000000000000" pitchFamily="2" charset="0"/>
-              </a:rPr>
-              <a:t> </a:t>
-            </a:r>
-            <a:r>
-              <a:rPr lang="en-US" b="0" i="0" dirty="0" err="1">
-                <a:solidFill>
-                  <a:srgbClr val="242438"/>
-                </a:solidFill>
-                <a:effectLst/>
-                <a:latin typeface="Roboto" panose="02000000000000000000" pitchFamily="2" charset="0"/>
+              <a:rPr lang="en-US" sz="1800" b="0" i="0" dirty="0">
+                <a:solidFill>
+                  <a:srgbClr val="242438"/>
+                </a:solidFill>
+                <a:effectLst/>
+                <a:latin typeface="PT Sans" panose="020B0503020203020204" pitchFamily="34" charset="-52"/>
+              </a:rPr>
+              <a:t> </a:t>
+            </a:r>
+            <a:r>
+              <a:rPr lang="en-US" sz="1800" b="0" i="0" dirty="0" err="1">
+                <a:solidFill>
+                  <a:srgbClr val="242438"/>
+                </a:solidFill>
+                <a:effectLst/>
+                <a:latin typeface="PT Sans" panose="020B0503020203020204" pitchFamily="34" charset="-52"/>
               </a:rPr>
               <a:t>informațiile</a:t>
             </a:r>
             <a:r>
-              <a:rPr lang="en-US" b="0" i="0" dirty="0">
-                <a:solidFill>
-                  <a:srgbClr val="242438"/>
-                </a:solidFill>
-                <a:effectLst/>
-                <a:latin typeface="Roboto" panose="02000000000000000000" pitchFamily="2" charset="0"/>
-              </a:rPr>
-              <a:t> </a:t>
-            </a:r>
-            <a:r>
-              <a:rPr lang="en-US" b="0" i="0" dirty="0" err="1">
-                <a:solidFill>
-                  <a:srgbClr val="242438"/>
-                </a:solidFill>
-                <a:effectLst/>
-                <a:latin typeface="Roboto" panose="02000000000000000000" pitchFamily="2" charset="0"/>
+              <a:rPr lang="en-US" sz="1800" b="0" i="0" dirty="0">
+                <a:solidFill>
+                  <a:srgbClr val="242438"/>
+                </a:solidFill>
+                <a:effectLst/>
+                <a:latin typeface="PT Sans" panose="020B0503020203020204" pitchFamily="34" charset="-52"/>
+              </a:rPr>
+              <a:t> </a:t>
+            </a:r>
+            <a:r>
+              <a:rPr lang="en-US" sz="1800" b="0" i="0" dirty="0" err="1">
+                <a:solidFill>
+                  <a:srgbClr val="242438"/>
+                </a:solidFill>
+                <a:effectLst/>
+                <a:latin typeface="PT Sans" panose="020B0503020203020204" pitchFamily="34" charset="-52"/>
               </a:rPr>
               <a:t>conexe</a:t>
             </a:r>
             <a:r>
-              <a:rPr lang="en-US" b="0" i="0" dirty="0">
-                <a:solidFill>
-                  <a:srgbClr val="242438"/>
-                </a:solidFill>
-                <a:effectLst/>
-                <a:latin typeface="Roboto" panose="02000000000000000000" pitchFamily="2" charset="0"/>
+              <a:rPr lang="en-US" sz="1800" b="0" i="0" dirty="0">
+                <a:solidFill>
+                  <a:srgbClr val="242438"/>
+                </a:solidFill>
+                <a:effectLst/>
+                <a:latin typeface="PT Sans" panose="020B0503020203020204" pitchFamily="34" charset="-52"/>
               </a:rPr>
               <a:t>, </a:t>
             </a:r>
             <a:r>
-              <a:rPr lang="en-US" b="0" i="0" dirty="0" err="1">
-                <a:solidFill>
-                  <a:srgbClr val="242438"/>
-                </a:solidFill>
-                <a:effectLst/>
-                <a:latin typeface="Roboto" panose="02000000000000000000" pitchFamily="2" charset="0"/>
+              <a:rPr lang="en-US" sz="1800" b="0" i="0" dirty="0" err="1">
+                <a:solidFill>
+                  <a:srgbClr val="242438"/>
+                </a:solidFill>
+                <a:effectLst/>
+                <a:latin typeface="PT Sans" panose="020B0503020203020204" pitchFamily="34" charset="-52"/>
               </a:rPr>
               <a:t>dar</a:t>
             </a:r>
             <a:r>
-              <a:rPr lang="en-US" b="0" i="0" dirty="0">
-                <a:solidFill>
-                  <a:srgbClr val="242438"/>
-                </a:solidFill>
-                <a:effectLst/>
-                <a:latin typeface="Roboto" panose="02000000000000000000" pitchFamily="2" charset="0"/>
-              </a:rPr>
-              <a:t> </a:t>
-            </a:r>
-            <a:r>
-              <a:rPr lang="en-US" b="0" i="0" dirty="0" err="1">
-                <a:solidFill>
-                  <a:srgbClr val="242438"/>
-                </a:solidFill>
-                <a:effectLst/>
-                <a:latin typeface="Roboto" panose="02000000000000000000" pitchFamily="2" charset="0"/>
+              <a:rPr lang="en-US" sz="1800" b="0" i="0" dirty="0">
+                <a:solidFill>
+                  <a:srgbClr val="242438"/>
+                </a:solidFill>
+                <a:effectLst/>
+                <a:latin typeface="PT Sans" panose="020B0503020203020204" pitchFamily="34" charset="-52"/>
+              </a:rPr>
+              <a:t> </a:t>
+            </a:r>
+            <a:r>
+              <a:rPr lang="en-US" sz="1800" b="0" i="0" dirty="0" err="1">
+                <a:solidFill>
+                  <a:srgbClr val="242438"/>
+                </a:solidFill>
+                <a:effectLst/>
+                <a:latin typeface="PT Sans" panose="020B0503020203020204" pitchFamily="34" charset="-52"/>
               </a:rPr>
               <a:t>aici</a:t>
             </a:r>
             <a:r>
-              <a:rPr lang="en-US" b="0" i="0" dirty="0">
-                <a:solidFill>
-                  <a:srgbClr val="242438"/>
-                </a:solidFill>
-                <a:effectLst/>
-                <a:latin typeface="Roboto" panose="02000000000000000000" pitchFamily="2" charset="0"/>
+              <a:rPr lang="en-US" sz="1800" b="0" i="0" dirty="0">
+                <a:solidFill>
+                  <a:srgbClr val="242438"/>
+                </a:solidFill>
+                <a:effectLst/>
+                <a:latin typeface="PT Sans" panose="020B0503020203020204" pitchFamily="34" charset="-52"/>
               </a:rPr>
               <a:t> se </a:t>
             </a:r>
             <a:r>
-              <a:rPr lang="en-US" b="0" i="0" dirty="0" err="1">
-                <a:solidFill>
-                  <a:srgbClr val="242438"/>
-                </a:solidFill>
-                <a:effectLst/>
-                <a:latin typeface="Roboto" panose="02000000000000000000" pitchFamily="2" charset="0"/>
+              <a:rPr lang="en-US" sz="1800" b="0" i="0" dirty="0" err="1">
+                <a:solidFill>
+                  <a:srgbClr val="242438"/>
+                </a:solidFill>
+                <a:effectLst/>
+                <a:latin typeface="PT Sans" panose="020B0503020203020204" pitchFamily="34" charset="-52"/>
               </a:rPr>
               <a:t>află</a:t>
             </a:r>
             <a:r>
-              <a:rPr lang="en-US" b="0" i="0" dirty="0">
-                <a:solidFill>
-                  <a:srgbClr val="242438"/>
-                </a:solidFill>
-                <a:effectLst/>
-                <a:latin typeface="Roboto" panose="02000000000000000000" pitchFamily="2" charset="0"/>
-              </a:rPr>
-              <a:t> </a:t>
-            </a:r>
-            <a:r>
-              <a:rPr lang="en-US" b="0" i="0" dirty="0" err="1">
-                <a:solidFill>
-                  <a:srgbClr val="242438"/>
-                </a:solidFill>
-                <a:effectLst/>
-                <a:latin typeface="Roboto" panose="02000000000000000000" pitchFamily="2" charset="0"/>
+              <a:rPr lang="en-US" sz="1800" b="0" i="0" dirty="0">
+                <a:solidFill>
+                  <a:srgbClr val="242438"/>
+                </a:solidFill>
+                <a:effectLst/>
+                <a:latin typeface="PT Sans" panose="020B0503020203020204" pitchFamily="34" charset="-52"/>
+              </a:rPr>
+              <a:t> </a:t>
+            </a:r>
+            <a:r>
+              <a:rPr lang="en-US" sz="1800" b="0" i="0" dirty="0" err="1">
+                <a:solidFill>
+                  <a:srgbClr val="242438"/>
+                </a:solidFill>
+                <a:effectLst/>
+                <a:latin typeface="PT Sans" panose="020B0503020203020204" pitchFamily="34" charset="-52"/>
               </a:rPr>
               <a:t>defectul</a:t>
             </a:r>
             <a:r>
-              <a:rPr lang="en-US" b="0" i="0" dirty="0">
-                <a:solidFill>
-                  <a:srgbClr val="242438"/>
-                </a:solidFill>
-                <a:effectLst/>
-                <a:latin typeface="Roboto" panose="02000000000000000000" pitchFamily="2" charset="0"/>
+              <a:rPr lang="en-US" sz="1800" b="0" i="0" dirty="0">
+                <a:solidFill>
+                  <a:srgbClr val="242438"/>
+                </a:solidFill>
+                <a:effectLst/>
+                <a:latin typeface="PT Sans" panose="020B0503020203020204" pitchFamily="34" charset="-52"/>
               </a:rPr>
               <a:t>. </a:t>
             </a:r>
             <a:r>
-              <a:rPr lang="en-US" b="0" i="0" dirty="0" err="1">
-                <a:solidFill>
-                  <a:srgbClr val="242438"/>
-                </a:solidFill>
-                <a:effectLst/>
-                <a:latin typeface="Roboto" panose="02000000000000000000" pitchFamily="2" charset="0"/>
+              <a:rPr lang="en-US" sz="1800" b="0" i="0" dirty="0" err="1">
+                <a:solidFill>
+                  <a:srgbClr val="242438"/>
+                </a:solidFill>
+                <a:effectLst/>
+                <a:latin typeface="PT Sans" panose="020B0503020203020204" pitchFamily="34" charset="-52"/>
               </a:rPr>
               <a:t>Fără</a:t>
             </a:r>
             <a:r>
-              <a:rPr lang="en-US" b="0" i="0" dirty="0">
-                <a:solidFill>
-                  <a:srgbClr val="242438"/>
-                </a:solidFill>
-                <a:effectLst/>
-                <a:latin typeface="Roboto" panose="02000000000000000000" pitchFamily="2" charset="0"/>
-              </a:rPr>
-              <a:t> </a:t>
-            </a:r>
-            <a:r>
-              <a:rPr lang="en-US" b="0" i="0" dirty="0" err="1">
-                <a:solidFill>
-                  <a:srgbClr val="242438"/>
-                </a:solidFill>
-                <a:effectLst/>
-                <a:latin typeface="Roboto" panose="02000000000000000000" pitchFamily="2" charset="0"/>
+              <a:rPr lang="en-US" sz="1800" b="0" i="0" dirty="0">
+                <a:solidFill>
+                  <a:srgbClr val="242438"/>
+                </a:solidFill>
+                <a:effectLst/>
+                <a:latin typeface="PT Sans" panose="020B0503020203020204" pitchFamily="34" charset="-52"/>
+              </a:rPr>
+              <a:t> </a:t>
+            </a:r>
+            <a:r>
+              <a:rPr lang="en-US" sz="1800" b="0" i="0" dirty="0" err="1">
+                <a:solidFill>
+                  <a:srgbClr val="242438"/>
+                </a:solidFill>
+                <a:effectLst/>
+                <a:latin typeface="PT Sans" panose="020B0503020203020204" pitchFamily="34" charset="-52"/>
               </a:rPr>
               <a:t>salubritate</a:t>
             </a:r>
             <a:r>
-              <a:rPr lang="en-US" b="0" i="0" dirty="0">
-                <a:solidFill>
-                  <a:srgbClr val="242438"/>
-                </a:solidFill>
-                <a:effectLst/>
-                <a:latin typeface="Roboto" panose="02000000000000000000" pitchFamily="2" charset="0"/>
+              <a:rPr lang="en-US" sz="1800" b="0" i="0" dirty="0">
+                <a:solidFill>
+                  <a:srgbClr val="242438"/>
+                </a:solidFill>
+                <a:effectLst/>
+                <a:latin typeface="PT Sans" panose="020B0503020203020204" pitchFamily="34" charset="-52"/>
               </a:rPr>
               <a:t> de </a:t>
             </a:r>
             <a:r>
-              <a:rPr lang="en-US" b="0" i="0" dirty="0" err="1">
-                <a:solidFill>
-                  <a:srgbClr val="242438"/>
-                </a:solidFill>
-                <a:effectLst/>
-                <a:latin typeface="Roboto" panose="02000000000000000000" pitchFamily="2" charset="0"/>
+              <a:rPr lang="en-US" sz="1800" b="0" i="0" dirty="0" err="1">
+                <a:solidFill>
+                  <a:srgbClr val="242438"/>
+                </a:solidFill>
+                <a:effectLst/>
+                <a:latin typeface="PT Sans" panose="020B0503020203020204" pitchFamily="34" charset="-52"/>
               </a:rPr>
               <a:t>intrare</a:t>
             </a:r>
             <a:r>
-              <a:rPr lang="en-US" b="0" i="0" dirty="0">
-                <a:solidFill>
-                  <a:srgbClr val="242438"/>
-                </a:solidFill>
-                <a:effectLst/>
-                <a:latin typeface="Roboto" panose="02000000000000000000" pitchFamily="2" charset="0"/>
-              </a:rPr>
-              <a:t> </a:t>
-            </a:r>
-            <a:r>
-              <a:rPr lang="en-US" b="0" i="0" dirty="0" err="1">
-                <a:solidFill>
-                  <a:srgbClr val="242438"/>
-                </a:solidFill>
-                <a:effectLst/>
-                <a:latin typeface="Roboto" panose="02000000000000000000" pitchFamily="2" charset="0"/>
+              <a:rPr lang="en-US" sz="1800" b="0" i="0" dirty="0">
+                <a:solidFill>
+                  <a:srgbClr val="242438"/>
+                </a:solidFill>
+                <a:effectLst/>
+                <a:latin typeface="PT Sans" panose="020B0503020203020204" pitchFamily="34" charset="-52"/>
+              </a:rPr>
+              <a:t> </a:t>
+            </a:r>
+            <a:r>
+              <a:rPr lang="en-US" sz="1800" b="0" i="0" dirty="0" err="1">
+                <a:solidFill>
+                  <a:srgbClr val="242438"/>
+                </a:solidFill>
+                <a:effectLst/>
+                <a:latin typeface="PT Sans" panose="020B0503020203020204" pitchFamily="34" charset="-52"/>
               </a:rPr>
               <a:t>corectă</a:t>
             </a:r>
             <a:r>
-              <a:rPr lang="en-US" b="0" i="0" dirty="0">
-                <a:solidFill>
-                  <a:srgbClr val="242438"/>
-                </a:solidFill>
-                <a:effectLst/>
-                <a:latin typeface="Roboto" panose="02000000000000000000" pitchFamily="2" charset="0"/>
+              <a:rPr lang="en-US" sz="1800" b="0" i="0" dirty="0">
+                <a:solidFill>
+                  <a:srgbClr val="242438"/>
+                </a:solidFill>
+                <a:effectLst/>
+                <a:latin typeface="PT Sans" panose="020B0503020203020204" pitchFamily="34" charset="-52"/>
               </a:rPr>
               <a:t>, </a:t>
             </a:r>
             <a:r>
-              <a:rPr lang="en-US" b="0" i="0" dirty="0" err="1">
-                <a:solidFill>
-                  <a:srgbClr val="242438"/>
-                </a:solidFill>
-                <a:effectLst/>
-                <a:latin typeface="Roboto" panose="02000000000000000000" pitchFamily="2" charset="0"/>
+              <a:rPr lang="en-US" sz="1800" b="0" i="0" dirty="0" err="1">
+                <a:solidFill>
+                  <a:srgbClr val="242438"/>
+                </a:solidFill>
+                <a:effectLst/>
+                <a:latin typeface="PT Sans" panose="020B0503020203020204" pitchFamily="34" charset="-52"/>
               </a:rPr>
               <a:t>suntem</a:t>
             </a:r>
             <a:r>
-              <a:rPr lang="en-US" b="0" i="0" dirty="0">
-                <a:solidFill>
-                  <a:srgbClr val="242438"/>
-                </a:solidFill>
-                <a:effectLst/>
-                <a:latin typeface="Roboto" panose="02000000000000000000" pitchFamily="2" charset="0"/>
-              </a:rPr>
-              <a:t> </a:t>
-            </a:r>
-            <a:r>
-              <a:rPr lang="en-US" b="0" i="0" dirty="0" err="1">
-                <a:solidFill>
-                  <a:srgbClr val="242438"/>
-                </a:solidFill>
-                <a:effectLst/>
-                <a:latin typeface="Roboto" panose="02000000000000000000" pitchFamily="2" charset="0"/>
+              <a:rPr lang="en-US" sz="1800" b="0" i="0" dirty="0">
+                <a:solidFill>
+                  <a:srgbClr val="242438"/>
+                </a:solidFill>
+                <a:effectLst/>
+                <a:latin typeface="PT Sans" panose="020B0503020203020204" pitchFamily="34" charset="-52"/>
+              </a:rPr>
+              <a:t> </a:t>
+            </a:r>
+            <a:r>
+              <a:rPr lang="en-US" sz="1800" b="0" i="0" dirty="0" err="1">
+                <a:solidFill>
+                  <a:srgbClr val="242438"/>
+                </a:solidFill>
+                <a:effectLst/>
+                <a:latin typeface="PT Sans" panose="020B0503020203020204" pitchFamily="34" charset="-52"/>
               </a:rPr>
               <a:t>capabili</a:t>
             </a:r>
             <a:r>
-              <a:rPr lang="en-US" b="0" i="0" dirty="0">
-                <a:solidFill>
-                  <a:srgbClr val="242438"/>
-                </a:solidFill>
-                <a:effectLst/>
-                <a:latin typeface="Roboto" panose="02000000000000000000" pitchFamily="2" charset="0"/>
-              </a:rPr>
-              <a:t> </a:t>
-            </a:r>
-            <a:r>
-              <a:rPr lang="en-US" b="0" i="0" dirty="0" err="1">
-                <a:solidFill>
-                  <a:srgbClr val="242438"/>
-                </a:solidFill>
-                <a:effectLst/>
-                <a:latin typeface="Roboto" panose="02000000000000000000" pitchFamily="2" charset="0"/>
+              <a:rPr lang="en-US" sz="1800" b="0" i="0" dirty="0">
+                <a:solidFill>
+                  <a:srgbClr val="242438"/>
+                </a:solidFill>
+                <a:effectLst/>
+                <a:latin typeface="PT Sans" panose="020B0503020203020204" pitchFamily="34" charset="-52"/>
+              </a:rPr>
+              <a:t> </a:t>
+            </a:r>
+            <a:r>
+              <a:rPr lang="en-US" sz="1800" b="0" i="0" dirty="0" err="1">
+                <a:solidFill>
+                  <a:srgbClr val="242438"/>
+                </a:solidFill>
+                <a:effectLst/>
+                <a:latin typeface="PT Sans" panose="020B0503020203020204" pitchFamily="34" charset="-52"/>
               </a:rPr>
               <a:t>să</a:t>
             </a:r>
             <a:r>
-              <a:rPr lang="en-US" b="0" i="0" dirty="0">
-                <a:solidFill>
-                  <a:srgbClr val="242438"/>
-                </a:solidFill>
-                <a:effectLst/>
-                <a:latin typeface="Roboto" panose="02000000000000000000" pitchFamily="2" charset="0"/>
-              </a:rPr>
-              <a:t> </a:t>
-            </a:r>
-            <a:r>
-              <a:rPr lang="en-US" b="0" i="0" dirty="0" err="1">
-                <a:solidFill>
-                  <a:srgbClr val="242438"/>
-                </a:solidFill>
-                <a:effectLst/>
-                <a:latin typeface="Roboto" panose="02000000000000000000" pitchFamily="2" charset="0"/>
+              <a:rPr lang="en-US" sz="1800" b="0" i="0" dirty="0">
+                <a:solidFill>
+                  <a:srgbClr val="242438"/>
+                </a:solidFill>
+                <a:effectLst/>
+                <a:latin typeface="PT Sans" panose="020B0503020203020204" pitchFamily="34" charset="-52"/>
+              </a:rPr>
+              <a:t> </a:t>
+            </a:r>
+            <a:r>
+              <a:rPr lang="en-US" sz="1800" b="0" i="0" dirty="0" err="1">
+                <a:solidFill>
+                  <a:srgbClr val="242438"/>
+                </a:solidFill>
+                <a:effectLst/>
+                <a:latin typeface="PT Sans" panose="020B0503020203020204" pitchFamily="34" charset="-52"/>
               </a:rPr>
               <a:t>efectuăm</a:t>
             </a:r>
             <a:r>
-              <a:rPr lang="en-US" b="0" i="0" dirty="0">
-                <a:solidFill>
-                  <a:srgbClr val="242438"/>
-                </a:solidFill>
-                <a:effectLst/>
-                <a:latin typeface="Roboto" panose="02000000000000000000" pitchFamily="2" charset="0"/>
+              <a:rPr lang="en-US" sz="1800" b="0" i="0" dirty="0">
+                <a:solidFill>
+                  <a:srgbClr val="242438"/>
+                </a:solidFill>
+                <a:effectLst/>
+                <a:latin typeface="PT Sans" panose="020B0503020203020204" pitchFamily="34" charset="-52"/>
               </a:rPr>
               <a:t> un </a:t>
             </a:r>
             <a:r>
-              <a:rPr lang="en-US" b="0" i="0" dirty="0" err="1">
-                <a:solidFill>
-                  <a:srgbClr val="242438"/>
-                </a:solidFill>
-                <a:effectLst/>
-                <a:latin typeface="Roboto" panose="02000000000000000000" pitchFamily="2" charset="0"/>
+              <a:rPr lang="en-US" sz="1800" b="0" i="0" dirty="0" err="1">
+                <a:solidFill>
+                  <a:srgbClr val="242438"/>
+                </a:solidFill>
+                <a:effectLst/>
+                <a:latin typeface="PT Sans" panose="020B0503020203020204" pitchFamily="34" charset="-52"/>
               </a:rPr>
               <a:t>atac</a:t>
             </a:r>
             <a:r>
-              <a:rPr lang="en-US" b="0" i="0" dirty="0">
-                <a:solidFill>
-                  <a:srgbClr val="242438"/>
-                </a:solidFill>
-                <a:effectLst/>
-                <a:latin typeface="Roboto" panose="02000000000000000000" pitchFamily="2" charset="0"/>
+              <a:rPr lang="en-US" sz="1800" b="0" i="0" dirty="0">
+                <a:solidFill>
+                  <a:srgbClr val="242438"/>
+                </a:solidFill>
+                <a:effectLst/>
+                <a:latin typeface="PT Sans" panose="020B0503020203020204" pitchFamily="34" charset="-52"/>
               </a:rPr>
               <a:t> XSS </a:t>
             </a:r>
             <a:r>
-              <a:rPr lang="en-US" b="0" i="0" dirty="0" err="1">
-                <a:solidFill>
-                  <a:srgbClr val="242438"/>
-                </a:solidFill>
-                <a:effectLst/>
-                <a:latin typeface="Roboto" panose="02000000000000000000" pitchFamily="2" charset="0"/>
+              <a:rPr lang="en-US" sz="1800" b="0" i="0" dirty="0" err="1">
+                <a:solidFill>
+                  <a:srgbClr val="242438"/>
+                </a:solidFill>
+                <a:effectLst/>
+                <a:latin typeface="PT Sans" panose="020B0503020203020204" pitchFamily="34" charset="-52"/>
               </a:rPr>
               <a:t>împotriva</a:t>
             </a:r>
             <a:r>
-              <a:rPr lang="en-US" b="0" i="0" dirty="0">
-                <a:solidFill>
-                  <a:srgbClr val="242438"/>
-                </a:solidFill>
-                <a:effectLst/>
-                <a:latin typeface="Roboto" panose="02000000000000000000" pitchFamily="2" charset="0"/>
-              </a:rPr>
-              <a:t> </a:t>
-            </a:r>
-            <a:r>
-              <a:rPr lang="en-US" b="0" i="0" dirty="0" err="1">
-                <a:solidFill>
-                  <a:srgbClr val="242438"/>
-                </a:solidFill>
-                <a:effectLst/>
-                <a:latin typeface="Roboto" panose="02000000000000000000" pitchFamily="2" charset="0"/>
+              <a:rPr lang="en-US" sz="1800" b="0" i="0" dirty="0">
+                <a:solidFill>
+                  <a:srgbClr val="242438"/>
+                </a:solidFill>
+                <a:effectLst/>
+                <a:latin typeface="PT Sans" panose="020B0503020203020204" pitchFamily="34" charset="-52"/>
+              </a:rPr>
+              <a:t> </a:t>
+            </a:r>
+            <a:r>
+              <a:rPr lang="en-US" sz="1800" b="0" i="0" dirty="0" err="1">
+                <a:solidFill>
+                  <a:srgbClr val="242438"/>
+                </a:solidFill>
+                <a:effectLst/>
+                <a:latin typeface="PT Sans" panose="020B0503020203020204" pitchFamily="34" charset="-52"/>
               </a:rPr>
               <a:t>barei</a:t>
             </a:r>
             <a:r>
-              <a:rPr lang="en-US" b="0" i="0" dirty="0">
-                <a:solidFill>
-                  <a:srgbClr val="242438"/>
-                </a:solidFill>
-                <a:effectLst/>
-                <a:latin typeface="Roboto" panose="02000000000000000000" pitchFamily="2" charset="0"/>
+              <a:rPr lang="en-US" sz="1800" b="0" i="0" dirty="0">
+                <a:solidFill>
+                  <a:srgbClr val="242438"/>
+                </a:solidFill>
+                <a:effectLst/>
+                <a:latin typeface="PT Sans" panose="020B0503020203020204" pitchFamily="34" charset="-52"/>
               </a:rPr>
               <a:t> de </a:t>
             </a:r>
             <a:r>
-              <a:rPr lang="en-US" b="0" i="0" dirty="0" err="1">
-                <a:solidFill>
-                  <a:srgbClr val="242438"/>
-                </a:solidFill>
-                <a:effectLst/>
-                <a:latin typeface="Roboto" panose="02000000000000000000" pitchFamily="2" charset="0"/>
+              <a:rPr lang="en-US" sz="1800" b="0" i="0" dirty="0" err="1">
+                <a:solidFill>
+                  <a:srgbClr val="242438"/>
+                </a:solidFill>
+                <a:effectLst/>
+                <a:latin typeface="PT Sans" panose="020B0503020203020204" pitchFamily="34" charset="-52"/>
               </a:rPr>
               <a:t>căutare</a:t>
             </a:r>
             <a:r>
-              <a:rPr lang="en-US" b="0" i="0" dirty="0">
-                <a:solidFill>
-                  <a:srgbClr val="242438"/>
-                </a:solidFill>
-                <a:effectLst/>
-                <a:latin typeface="Roboto" panose="02000000000000000000" pitchFamily="2" charset="0"/>
+              <a:rPr lang="en-US" sz="1800" b="0" i="0" dirty="0">
+                <a:solidFill>
+                  <a:srgbClr val="242438"/>
+                </a:solidFill>
+                <a:effectLst/>
+                <a:latin typeface="PT Sans" panose="020B0503020203020204" pitchFamily="34" charset="-52"/>
               </a:rPr>
               <a:t>.</a:t>
             </a:r>
-            <a:endParaRPr lang="ru-RU" dirty="0"/>
+            <a:endParaRPr lang="ru-RU" sz="1800" dirty="0">
+              <a:latin typeface="PT Sans" panose="020B0503020203020204" pitchFamily="34" charset="-52"/>
+            </a:endParaRPr>
           </a:p>
         </p:txBody>
       </p:sp>

</xml_diff>